<commit_message>
se subio las pr practicas
</commit_message>
<xml_diff>
--- a/2015-2016/clases/informatica_basica/clase_11/clase_11_picPick.pptx
+++ b/2015-2016/clases/informatica_basica/clase_11/clase_11_picPick.pptx
@@ -1,116 +1,21 @@
 
 <file path=ppt/presentation.xml><?xml version="1.0" encoding="utf-8"?>
-<p:presentation xmlns:a="http://schemas.openxmlformats.org/drawingml/2006/main" xmlns:r="http://schemas.openxmlformats.org/officeDocument/2006/relationships" xmlns:p="http://schemas.openxmlformats.org/presentationml/2006/main">
+<p:presentation xmlns:a="http://schemas.openxmlformats.org/drawingml/2006/main" xmlns:p="http://schemas.openxmlformats.org/presentationml/2006/main" xmlns:r="http://schemas.openxmlformats.org/officeDocument/2006/relationships">
   <p:sldMasterIdLst>
-    <p:sldMasterId id="2147483648" r:id="rId1"/>
+    <p:sldMasterId id="2147483648" r:id="rId2"/>
+    <p:sldMasterId id="2147483661" r:id="rId3"/>
   </p:sldMasterIdLst>
   <p:sldIdLst>
-    <p:sldId id="256" r:id="rId2"/>
-    <p:sldId id="257" r:id="rId3"/>
-    <p:sldId id="258" r:id="rId4"/>
+    <p:sldId id="256" r:id="rId4"/>
+    <p:sldId id="257" r:id="rId5"/>
   </p:sldIdLst>
-  <p:sldSz cx="9144000" cy="6858000" type="screen4x3"/>
-  <p:notesSz cx="7559675" cy="10691813"/>
-  <p:defaultTextStyle>
-    <a:defPPr>
-      <a:defRPr lang="es-ES"/>
-    </a:defPPr>
-    <a:lvl1pPr marL="0" algn="l" defTabSz="914400" rtl="0" eaLnBrk="1" latinLnBrk="0" hangingPunct="1">
-      <a:defRPr sz="1800" kern="1200">
-        <a:solidFill>
-          <a:schemeClr val="tx1"/>
-        </a:solidFill>
-        <a:latin typeface="+mn-lt"/>
-        <a:ea typeface="+mn-ea"/>
-        <a:cs typeface="+mn-cs"/>
-      </a:defRPr>
-    </a:lvl1pPr>
-    <a:lvl2pPr marL="457200" algn="l" defTabSz="914400" rtl="0" eaLnBrk="1" latinLnBrk="0" hangingPunct="1">
-      <a:defRPr sz="1800" kern="1200">
-        <a:solidFill>
-          <a:schemeClr val="tx1"/>
-        </a:solidFill>
-        <a:latin typeface="+mn-lt"/>
-        <a:ea typeface="+mn-ea"/>
-        <a:cs typeface="+mn-cs"/>
-      </a:defRPr>
-    </a:lvl2pPr>
-    <a:lvl3pPr marL="914400" algn="l" defTabSz="914400" rtl="0" eaLnBrk="1" latinLnBrk="0" hangingPunct="1">
-      <a:defRPr sz="1800" kern="1200">
-        <a:solidFill>
-          <a:schemeClr val="tx1"/>
-        </a:solidFill>
-        <a:latin typeface="+mn-lt"/>
-        <a:ea typeface="+mn-ea"/>
-        <a:cs typeface="+mn-cs"/>
-      </a:defRPr>
-    </a:lvl3pPr>
-    <a:lvl4pPr marL="1371600" algn="l" defTabSz="914400" rtl="0" eaLnBrk="1" latinLnBrk="0" hangingPunct="1">
-      <a:defRPr sz="1800" kern="1200">
-        <a:solidFill>
-          <a:schemeClr val="tx1"/>
-        </a:solidFill>
-        <a:latin typeface="+mn-lt"/>
-        <a:ea typeface="+mn-ea"/>
-        <a:cs typeface="+mn-cs"/>
-      </a:defRPr>
-    </a:lvl4pPr>
-    <a:lvl5pPr marL="1828800" algn="l" defTabSz="914400" rtl="0" eaLnBrk="1" latinLnBrk="0" hangingPunct="1">
-      <a:defRPr sz="1800" kern="1200">
-        <a:solidFill>
-          <a:schemeClr val="tx1"/>
-        </a:solidFill>
-        <a:latin typeface="+mn-lt"/>
-        <a:ea typeface="+mn-ea"/>
-        <a:cs typeface="+mn-cs"/>
-      </a:defRPr>
-    </a:lvl5pPr>
-    <a:lvl6pPr marL="2286000" algn="l" defTabSz="914400" rtl="0" eaLnBrk="1" latinLnBrk="0" hangingPunct="1">
-      <a:defRPr sz="1800" kern="1200">
-        <a:solidFill>
-          <a:schemeClr val="tx1"/>
-        </a:solidFill>
-        <a:latin typeface="+mn-lt"/>
-        <a:ea typeface="+mn-ea"/>
-        <a:cs typeface="+mn-cs"/>
-      </a:defRPr>
-    </a:lvl6pPr>
-    <a:lvl7pPr marL="2743200" algn="l" defTabSz="914400" rtl="0" eaLnBrk="1" latinLnBrk="0" hangingPunct="1">
-      <a:defRPr sz="1800" kern="1200">
-        <a:solidFill>
-          <a:schemeClr val="tx1"/>
-        </a:solidFill>
-        <a:latin typeface="+mn-lt"/>
-        <a:ea typeface="+mn-ea"/>
-        <a:cs typeface="+mn-cs"/>
-      </a:defRPr>
-    </a:lvl7pPr>
-    <a:lvl8pPr marL="3200400" algn="l" defTabSz="914400" rtl="0" eaLnBrk="1" latinLnBrk="0" hangingPunct="1">
-      <a:defRPr sz="1800" kern="1200">
-        <a:solidFill>
-          <a:schemeClr val="tx1"/>
-        </a:solidFill>
-        <a:latin typeface="+mn-lt"/>
-        <a:ea typeface="+mn-ea"/>
-        <a:cs typeface="+mn-cs"/>
-      </a:defRPr>
-    </a:lvl8pPr>
-    <a:lvl9pPr marL="3657600" algn="l" defTabSz="914400" rtl="0" eaLnBrk="1" latinLnBrk="0" hangingPunct="1">
-      <a:defRPr sz="1800" kern="1200">
-        <a:solidFill>
-          <a:schemeClr val="tx1"/>
-        </a:solidFill>
-        <a:latin typeface="+mn-lt"/>
-        <a:ea typeface="+mn-ea"/>
-        <a:cs typeface="+mn-cs"/>
-      </a:defRPr>
-    </a:lvl9pPr>
-  </p:defaultTextStyle>
+  <p:sldSz cx="9144000" cy="6858000"/>
+  <p:notesSz cx="7559675" cy="10691812"/>
 </p:presentation>
 </file>
 
 <file path=ppt/slideLayouts/slideLayout1.xml><?xml version="1.0" encoding="utf-8"?>
-<p:sldLayout xmlns:a="http://schemas.openxmlformats.org/drawingml/2006/main" xmlns:r="http://schemas.openxmlformats.org/officeDocument/2006/relationships" xmlns:p="http://schemas.openxmlformats.org/presentationml/2006/main" type="blank" preserve="1">
+<p:sldLayout xmlns:a="http://schemas.openxmlformats.org/drawingml/2006/main" xmlns:p="http://schemas.openxmlformats.org/presentationml/2006/main" xmlns:r="http://schemas.openxmlformats.org/officeDocument/2006/relationships" type="blank" preserve="1">
   <p:cSld name="Blank Slide">
     <p:spTree>
       <p:nvGrpSpPr>
@@ -128,14 +33,11 @@
       </p:grpSpPr>
     </p:spTree>
   </p:cSld>
-  <p:clrMapOvr>
-    <a:masterClrMapping/>
-  </p:clrMapOvr>
 </p:sldLayout>
 </file>
 
 <file path=ppt/slideLayouts/slideLayout10.xml><?xml version="1.0" encoding="utf-8"?>
-<p:sldLayout xmlns:a="http://schemas.openxmlformats.org/drawingml/2006/main" xmlns:r="http://schemas.openxmlformats.org/officeDocument/2006/relationships" xmlns:p="http://schemas.openxmlformats.org/presentationml/2006/main" type="objOverTx" preserve="1">
+<p:sldLayout xmlns:a="http://schemas.openxmlformats.org/drawingml/2006/main" xmlns:p="http://schemas.openxmlformats.org/presentationml/2006/main" xmlns:r="http://schemas.openxmlformats.org/officeDocument/2006/relationships" type="objOverTx" preserve="1">
   <p:cSld name="Title, Content over Content">
     <p:spTree>
       <p:nvGrpSpPr>
@@ -171,10 +73,8 @@
           </a:prstGeom>
         </p:spPr>
         <p:txBody>
-          <a:bodyPr lIns="0" tIns="0" rIns="0" bIns="0" anchor="ctr"/>
-          <a:lstStyle/>
-          <a:p>
-            <a:pPr algn="ctr"/>
+          <a:bodyPr lIns="0" rIns="0" tIns="0" bIns="0" anchor="ctr"/>
+          <a:p>
             <a:endParaRPr/>
           </a:p>
         </p:txBody>
@@ -199,8 +99,7 @@
           </a:prstGeom>
         </p:spPr>
         <p:txBody>
-          <a:bodyPr lIns="0" tIns="0" rIns="0" bIns="0"/>
-          <a:lstStyle/>
+          <a:bodyPr lIns="0" rIns="0" tIns="0" bIns="0"/>
           <a:p>
             <a:endParaRPr/>
           </a:p>
@@ -226,8 +125,7 @@
           </a:prstGeom>
         </p:spPr>
         <p:txBody>
-          <a:bodyPr lIns="0" tIns="0" rIns="0" bIns="0"/>
-          <a:lstStyle/>
+          <a:bodyPr lIns="0" rIns="0" tIns="0" bIns="0"/>
           <a:p>
             <a:endParaRPr/>
           </a:p>
@@ -235,14 +133,11 @@
       </p:sp>
     </p:spTree>
   </p:cSld>
-  <p:clrMapOvr>
-    <a:masterClrMapping/>
-  </p:clrMapOvr>
 </p:sldLayout>
 </file>
 
 <file path=ppt/slideLayouts/slideLayout11.xml><?xml version="1.0" encoding="utf-8"?>
-<p:sldLayout xmlns:a="http://schemas.openxmlformats.org/drawingml/2006/main" xmlns:r="http://schemas.openxmlformats.org/officeDocument/2006/relationships" xmlns:p="http://schemas.openxmlformats.org/presentationml/2006/main" type="fourObj" preserve="1">
+<p:sldLayout xmlns:a="http://schemas.openxmlformats.org/drawingml/2006/main" xmlns:p="http://schemas.openxmlformats.org/presentationml/2006/main" xmlns:r="http://schemas.openxmlformats.org/officeDocument/2006/relationships" type="fourObj" preserve="1">
   <p:cSld name="Title, 4 Content">
     <p:spTree>
       <p:nvGrpSpPr>
@@ -278,10 +173,8 @@
           </a:prstGeom>
         </p:spPr>
         <p:txBody>
-          <a:bodyPr lIns="0" tIns="0" rIns="0" bIns="0" anchor="ctr"/>
-          <a:lstStyle/>
-          <a:p>
-            <a:pPr algn="ctr"/>
+          <a:bodyPr lIns="0" rIns="0" tIns="0" bIns="0" anchor="ctr"/>
+          <a:p>
             <a:endParaRPr/>
           </a:p>
         </p:txBody>
@@ -306,8 +199,7 @@
           </a:prstGeom>
         </p:spPr>
         <p:txBody>
-          <a:bodyPr lIns="0" tIns="0" rIns="0" bIns="0"/>
-          <a:lstStyle/>
+          <a:bodyPr lIns="0" rIns="0" tIns="0" bIns="0"/>
           <a:p>
             <a:endParaRPr/>
           </a:p>
@@ -333,8 +225,7 @@
           </a:prstGeom>
         </p:spPr>
         <p:txBody>
-          <a:bodyPr lIns="0" tIns="0" rIns="0" bIns="0"/>
-          <a:lstStyle/>
+          <a:bodyPr lIns="0" rIns="0" tIns="0" bIns="0"/>
           <a:p>
             <a:endParaRPr/>
           </a:p>
@@ -360,8 +251,7 @@
           </a:prstGeom>
         </p:spPr>
         <p:txBody>
-          <a:bodyPr lIns="0" tIns="0" rIns="0" bIns="0"/>
-          <a:lstStyle/>
+          <a:bodyPr lIns="0" rIns="0" tIns="0" bIns="0"/>
           <a:p>
             <a:endParaRPr/>
           </a:p>
@@ -387,8 +277,7 @@
           </a:prstGeom>
         </p:spPr>
         <p:txBody>
-          <a:bodyPr lIns="0" tIns="0" rIns="0" bIns="0"/>
-          <a:lstStyle/>
+          <a:bodyPr lIns="0" rIns="0" tIns="0" bIns="0"/>
           <a:p>
             <a:endParaRPr/>
           </a:p>
@@ -396,14 +285,11 @@
       </p:sp>
     </p:spTree>
   </p:cSld>
-  <p:clrMapOvr>
-    <a:masterClrMapping/>
-  </p:clrMapOvr>
 </p:sldLayout>
 </file>
 
 <file path=ppt/slideLayouts/slideLayout12.xml><?xml version="1.0" encoding="utf-8"?>
-<p:sldLayout xmlns:a="http://schemas.openxmlformats.org/drawingml/2006/main" xmlns:r="http://schemas.openxmlformats.org/officeDocument/2006/relationships" xmlns:p="http://schemas.openxmlformats.org/presentationml/2006/main" type="blank" preserve="1">
+<p:sldLayout xmlns:a="http://schemas.openxmlformats.org/drawingml/2006/main" xmlns:p="http://schemas.openxmlformats.org/presentationml/2006/main" xmlns:r="http://schemas.openxmlformats.org/officeDocument/2006/relationships" type="blank" preserve="1">
   <p:cSld name="Title, 6 Content">
     <p:spTree>
       <p:nvGrpSpPr>
@@ -439,10 +325,8 @@
           </a:prstGeom>
         </p:spPr>
         <p:txBody>
-          <a:bodyPr lIns="0" tIns="0" rIns="0" bIns="0" anchor="ctr"/>
-          <a:lstStyle/>
-          <a:p>
-            <a:pPr algn="ctr"/>
+          <a:bodyPr lIns="0" rIns="0" tIns="0" bIns="0" anchor="ctr"/>
+          <a:p>
             <a:endParaRPr/>
           </a:p>
         </p:txBody>
@@ -467,8 +351,7 @@
           </a:prstGeom>
         </p:spPr>
         <p:txBody>
-          <a:bodyPr lIns="0" tIns="0" rIns="0" bIns="0"/>
-          <a:lstStyle/>
+          <a:bodyPr lIns="0" rIns="0" tIns="0" bIns="0"/>
           <a:p>
             <a:endParaRPr/>
           </a:p>
@@ -494,8 +377,7 @@
           </a:prstGeom>
         </p:spPr>
         <p:txBody>
-          <a:bodyPr lIns="0" tIns="0" rIns="0" bIns="0"/>
-          <a:lstStyle/>
+          <a:bodyPr lIns="0" rIns="0" tIns="0" bIns="0"/>
           <a:p>
             <a:endParaRPr/>
           </a:p>
@@ -503,7 +385,7 @@
       </p:sp>
       <p:pic>
         <p:nvPicPr>
-          <p:cNvPr id="35" name="34 Imagen"/>
+          <p:cNvPr id="35" name="" descr=""/>
           <p:cNvPicPr/>
           <p:nvPr/>
         </p:nvPicPr>
@@ -528,12 +410,12 @@
       </p:pic>
       <p:pic>
         <p:nvPicPr>
-          <p:cNvPr id="36" name="35 Imagen"/>
+          <p:cNvPr id="36" name="" descr=""/>
           <p:cNvPicPr/>
           <p:nvPr/>
         </p:nvPicPr>
         <p:blipFill>
-          <a:blip r:embed="rId2"/>
+          <a:blip r:embed="rId3"/>
           <a:stretch>
             <a:fillRect/>
           </a:stretch>
@@ -553,14 +435,33 @@
       </p:pic>
     </p:spTree>
   </p:cSld>
-  <p:clrMapOvr>
-    <a:masterClrMapping/>
-  </p:clrMapOvr>
 </p:sldLayout>
 </file>
 
-<file path=ppt/slideLayouts/slideLayout2.xml><?xml version="1.0" encoding="utf-8"?>
-<p:sldLayout xmlns:a="http://schemas.openxmlformats.org/drawingml/2006/main" xmlns:r="http://schemas.openxmlformats.org/officeDocument/2006/relationships" xmlns:p="http://schemas.openxmlformats.org/presentationml/2006/main" type="tx" preserve="1">
+<file path=ppt/slideLayouts/slideLayout13.xml><?xml version="1.0" encoding="utf-8"?>
+<p:sldLayout xmlns:a="http://schemas.openxmlformats.org/drawingml/2006/main" xmlns:p="http://schemas.openxmlformats.org/presentationml/2006/main" xmlns:r="http://schemas.openxmlformats.org/officeDocument/2006/relationships" type="blank" preserve="1">
+  <p:cSld name="Blank Slide">
+    <p:spTree>
+      <p:nvGrpSpPr>
+        <p:cNvPr id="1" name=""/>
+        <p:cNvGrpSpPr/>
+        <p:nvPr/>
+      </p:nvGrpSpPr>
+      <p:grpSpPr>
+        <a:xfrm>
+          <a:off x="0" y="0"/>
+          <a:ext cx="0" cy="0"/>
+          <a:chOff x="0" y="0"/>
+          <a:chExt cx="0" cy="0"/>
+        </a:xfrm>
+      </p:grpSpPr>
+    </p:spTree>
+  </p:cSld>
+</p:sldLayout>
+</file>
+
+<file path=ppt/slideLayouts/slideLayout14.xml><?xml version="1.0" encoding="utf-8"?>
+<p:sldLayout xmlns:a="http://schemas.openxmlformats.org/drawingml/2006/main" xmlns:p="http://schemas.openxmlformats.org/presentationml/2006/main" xmlns:r="http://schemas.openxmlformats.org/officeDocument/2006/relationships" type="tx" preserve="1">
   <p:cSld name="Title Slide">
     <p:spTree>
       <p:nvGrpSpPr>
@@ -578,7 +479,7 @@
       </p:grpSpPr>
       <p:sp>
         <p:nvSpPr>
-          <p:cNvPr id="3" name="PlaceHolder 1"/>
+          <p:cNvPr id="40" name="PlaceHolder 1"/>
           <p:cNvSpPr>
             <a:spLocks noGrp="1"/>
           </p:cNvSpPr>
@@ -596,17 +497,15 @@
           </a:prstGeom>
         </p:spPr>
         <p:txBody>
-          <a:bodyPr lIns="0" tIns="0" rIns="0" bIns="0" anchor="ctr"/>
-          <a:lstStyle/>
-          <a:p>
-            <a:pPr algn="ctr"/>
-            <a:endParaRPr/>
-          </a:p>
-        </p:txBody>
-      </p:sp>
-      <p:sp>
-        <p:nvSpPr>
-          <p:cNvPr id="4" name="PlaceHolder 2"/>
+          <a:bodyPr lIns="0" rIns="0" tIns="0" bIns="0" anchor="ctr"/>
+          <a:p>
+            <a:endParaRPr/>
+          </a:p>
+        </p:txBody>
+      </p:sp>
+      <p:sp>
+        <p:nvSpPr>
+          <p:cNvPr id="41" name="PlaceHolder 2"/>
           <p:cNvSpPr>
             <a:spLocks noGrp="1"/>
           </p:cNvSpPr>
@@ -624,8 +523,7 @@
           </a:prstGeom>
         </p:spPr>
         <p:txBody>
-          <a:bodyPr lIns="0" tIns="0" rIns="0" bIns="0" anchor="ctr"/>
-          <a:lstStyle/>
+          <a:bodyPr lIns="0" rIns="0" tIns="0" bIns="0" anchor="ctr"/>
           <a:p>
             <a:pPr algn="ctr"/>
             <a:endParaRPr/>
@@ -634,14 +532,11 @@
       </p:sp>
     </p:spTree>
   </p:cSld>
-  <p:clrMapOvr>
-    <a:masterClrMapping/>
-  </p:clrMapOvr>
 </p:sldLayout>
 </file>
 
-<file path=ppt/slideLayouts/slideLayout3.xml><?xml version="1.0" encoding="utf-8"?>
-<p:sldLayout xmlns:a="http://schemas.openxmlformats.org/drawingml/2006/main" xmlns:r="http://schemas.openxmlformats.org/officeDocument/2006/relationships" xmlns:p="http://schemas.openxmlformats.org/presentationml/2006/main" type="obj" preserve="1">
+<file path=ppt/slideLayouts/slideLayout15.xml><?xml version="1.0" encoding="utf-8"?>
+<p:sldLayout xmlns:a="http://schemas.openxmlformats.org/drawingml/2006/main" xmlns:p="http://schemas.openxmlformats.org/presentationml/2006/main" xmlns:r="http://schemas.openxmlformats.org/officeDocument/2006/relationships" type="obj" preserve="1">
   <p:cSld name="Title, Content">
     <p:spTree>
       <p:nvGrpSpPr>
@@ -659,7 +554,7 @@
       </p:grpSpPr>
       <p:sp>
         <p:nvSpPr>
-          <p:cNvPr id="5" name="PlaceHolder 1"/>
+          <p:cNvPr id="42" name="PlaceHolder 1"/>
           <p:cNvSpPr>
             <a:spLocks noGrp="1"/>
           </p:cNvSpPr>
@@ -677,17 +572,15 @@
           </a:prstGeom>
         </p:spPr>
         <p:txBody>
-          <a:bodyPr lIns="0" tIns="0" rIns="0" bIns="0" anchor="ctr"/>
-          <a:lstStyle/>
-          <a:p>
-            <a:pPr algn="ctr"/>
-            <a:endParaRPr/>
-          </a:p>
-        </p:txBody>
-      </p:sp>
-      <p:sp>
-        <p:nvSpPr>
-          <p:cNvPr id="6" name="PlaceHolder 2"/>
+          <a:bodyPr lIns="0" rIns="0" tIns="0" bIns="0" anchor="ctr"/>
+          <a:p>
+            <a:endParaRPr/>
+          </a:p>
+        </p:txBody>
+      </p:sp>
+      <p:sp>
+        <p:nvSpPr>
+          <p:cNvPr id="43" name="PlaceHolder 2"/>
           <p:cNvSpPr>
             <a:spLocks noGrp="1"/>
           </p:cNvSpPr>
@@ -705,8 +598,7 @@
           </a:prstGeom>
         </p:spPr>
         <p:txBody>
-          <a:bodyPr lIns="0" tIns="0" rIns="0" bIns="0"/>
-          <a:lstStyle/>
+          <a:bodyPr lIns="0" rIns="0" tIns="0" bIns="0"/>
           <a:p>
             <a:endParaRPr/>
           </a:p>
@@ -714,14 +606,11 @@
       </p:sp>
     </p:spTree>
   </p:cSld>
-  <p:clrMapOvr>
-    <a:masterClrMapping/>
-  </p:clrMapOvr>
 </p:sldLayout>
 </file>
 
-<file path=ppt/slideLayouts/slideLayout4.xml><?xml version="1.0" encoding="utf-8"?>
-<p:sldLayout xmlns:a="http://schemas.openxmlformats.org/drawingml/2006/main" xmlns:r="http://schemas.openxmlformats.org/officeDocument/2006/relationships" xmlns:p="http://schemas.openxmlformats.org/presentationml/2006/main" type="twoObj" preserve="1">
+<file path=ppt/slideLayouts/slideLayout16.xml><?xml version="1.0" encoding="utf-8"?>
+<p:sldLayout xmlns:a="http://schemas.openxmlformats.org/drawingml/2006/main" xmlns:p="http://schemas.openxmlformats.org/presentationml/2006/main" xmlns:r="http://schemas.openxmlformats.org/officeDocument/2006/relationships" type="twoObj" preserve="1">
   <p:cSld name="Title, 2 Content">
     <p:spTree>
       <p:nvGrpSpPr>
@@ -739,7 +628,7 @@
       </p:grpSpPr>
       <p:sp>
         <p:nvSpPr>
-          <p:cNvPr id="7" name="PlaceHolder 1"/>
+          <p:cNvPr id="44" name="PlaceHolder 1"/>
           <p:cNvSpPr>
             <a:spLocks noGrp="1"/>
           </p:cNvSpPr>
@@ -757,17 +646,15 @@
           </a:prstGeom>
         </p:spPr>
         <p:txBody>
-          <a:bodyPr lIns="0" tIns="0" rIns="0" bIns="0" anchor="ctr"/>
-          <a:lstStyle/>
-          <a:p>
-            <a:pPr algn="ctr"/>
-            <a:endParaRPr/>
-          </a:p>
-        </p:txBody>
-      </p:sp>
-      <p:sp>
-        <p:nvSpPr>
-          <p:cNvPr id="8" name="PlaceHolder 2"/>
+          <a:bodyPr lIns="0" rIns="0" tIns="0" bIns="0" anchor="ctr"/>
+          <a:p>
+            <a:endParaRPr/>
+          </a:p>
+        </p:txBody>
+      </p:sp>
+      <p:sp>
+        <p:nvSpPr>
+          <p:cNvPr id="45" name="PlaceHolder 2"/>
           <p:cNvSpPr>
             <a:spLocks noGrp="1"/>
           </p:cNvSpPr>
@@ -785,16 +672,15 @@
           </a:prstGeom>
         </p:spPr>
         <p:txBody>
-          <a:bodyPr lIns="0" tIns="0" rIns="0" bIns="0"/>
-          <a:lstStyle/>
-          <a:p>
-            <a:endParaRPr/>
-          </a:p>
-        </p:txBody>
-      </p:sp>
-      <p:sp>
-        <p:nvSpPr>
-          <p:cNvPr id="9" name="PlaceHolder 3"/>
+          <a:bodyPr lIns="0" rIns="0" tIns="0" bIns="0"/>
+          <a:p>
+            <a:endParaRPr/>
+          </a:p>
+        </p:txBody>
+      </p:sp>
+      <p:sp>
+        <p:nvSpPr>
+          <p:cNvPr id="46" name="PlaceHolder 3"/>
           <p:cNvSpPr>
             <a:spLocks noGrp="1"/>
           </p:cNvSpPr>
@@ -812,8 +698,7 @@
           </a:prstGeom>
         </p:spPr>
         <p:txBody>
-          <a:bodyPr lIns="0" tIns="0" rIns="0" bIns="0"/>
-          <a:lstStyle/>
+          <a:bodyPr lIns="0" rIns="0" tIns="0" bIns="0"/>
           <a:p>
             <a:endParaRPr/>
           </a:p>
@@ -821,14 +706,11 @@
       </p:sp>
     </p:spTree>
   </p:cSld>
-  <p:clrMapOvr>
-    <a:masterClrMapping/>
-  </p:clrMapOvr>
 </p:sldLayout>
 </file>
 
-<file path=ppt/slideLayouts/slideLayout5.xml><?xml version="1.0" encoding="utf-8"?>
-<p:sldLayout xmlns:a="http://schemas.openxmlformats.org/drawingml/2006/main" xmlns:r="http://schemas.openxmlformats.org/officeDocument/2006/relationships" xmlns:p="http://schemas.openxmlformats.org/presentationml/2006/main" type="titleOnly" preserve="1">
+<file path=ppt/slideLayouts/slideLayout17.xml><?xml version="1.0" encoding="utf-8"?>
+<p:sldLayout xmlns:a="http://schemas.openxmlformats.org/drawingml/2006/main" xmlns:p="http://schemas.openxmlformats.org/presentationml/2006/main" xmlns:r="http://schemas.openxmlformats.org/officeDocument/2006/relationships" type="titleOnly" preserve="1">
   <p:cSld name="Title Only">
     <p:spTree>
       <p:nvGrpSpPr>
@@ -846,7 +728,7 @@
       </p:grpSpPr>
       <p:sp>
         <p:nvSpPr>
-          <p:cNvPr id="10" name="PlaceHolder 1"/>
+          <p:cNvPr id="47" name="PlaceHolder 1"/>
           <p:cNvSpPr>
             <a:spLocks noGrp="1"/>
           </p:cNvSpPr>
@@ -864,24 +746,19 @@
           </a:prstGeom>
         </p:spPr>
         <p:txBody>
-          <a:bodyPr lIns="0" tIns="0" rIns="0" bIns="0" anchor="ctr"/>
-          <a:lstStyle/>
-          <a:p>
-            <a:pPr algn="ctr"/>
+          <a:bodyPr lIns="0" rIns="0" tIns="0" bIns="0" anchor="ctr"/>
+          <a:p>
             <a:endParaRPr/>
           </a:p>
         </p:txBody>
       </p:sp>
     </p:spTree>
   </p:cSld>
-  <p:clrMapOvr>
-    <a:masterClrMapping/>
-  </p:clrMapOvr>
 </p:sldLayout>
 </file>
 
-<file path=ppt/slideLayouts/slideLayout6.xml><?xml version="1.0" encoding="utf-8"?>
-<p:sldLayout xmlns:a="http://schemas.openxmlformats.org/drawingml/2006/main" xmlns:r="http://schemas.openxmlformats.org/officeDocument/2006/relationships" xmlns:p="http://schemas.openxmlformats.org/presentationml/2006/main" type="objOnly" preserve="1">
+<file path=ppt/slideLayouts/slideLayout18.xml><?xml version="1.0" encoding="utf-8"?>
+<p:sldLayout xmlns:a="http://schemas.openxmlformats.org/drawingml/2006/main" xmlns:p="http://schemas.openxmlformats.org/presentationml/2006/main" xmlns:r="http://schemas.openxmlformats.org/officeDocument/2006/relationships" type="objOnly" preserve="1">
   <p:cSld name="Centered Text">
     <p:spTree>
       <p:nvGrpSpPr>
@@ -899,7 +776,7 @@
       </p:grpSpPr>
       <p:sp>
         <p:nvSpPr>
-          <p:cNvPr id="11" name="PlaceHolder 1"/>
+          <p:cNvPr id="48" name="PlaceHolder 1"/>
           <p:cNvSpPr>
             <a:spLocks noGrp="1"/>
           </p:cNvSpPr>
@@ -917,8 +794,7 @@
           </a:prstGeom>
         </p:spPr>
         <p:txBody>
-          <a:bodyPr lIns="0" tIns="0" rIns="0" bIns="0" anchor="ctr"/>
-          <a:lstStyle/>
+          <a:bodyPr lIns="0" rIns="0" tIns="0" bIns="0" anchor="ctr"/>
           <a:p>
             <a:pPr algn="ctr"/>
             <a:endParaRPr/>
@@ -927,14 +803,11 @@
       </p:sp>
     </p:spTree>
   </p:cSld>
-  <p:clrMapOvr>
-    <a:masterClrMapping/>
-  </p:clrMapOvr>
 </p:sldLayout>
 </file>
 
-<file path=ppt/slideLayouts/slideLayout7.xml><?xml version="1.0" encoding="utf-8"?>
-<p:sldLayout xmlns:a="http://schemas.openxmlformats.org/drawingml/2006/main" xmlns:r="http://schemas.openxmlformats.org/officeDocument/2006/relationships" xmlns:p="http://schemas.openxmlformats.org/presentationml/2006/main" type="twoObjAndObj" preserve="1">
+<file path=ppt/slideLayouts/slideLayout19.xml><?xml version="1.0" encoding="utf-8"?>
+<p:sldLayout xmlns:a="http://schemas.openxmlformats.org/drawingml/2006/main" xmlns:p="http://schemas.openxmlformats.org/presentationml/2006/main" xmlns:r="http://schemas.openxmlformats.org/officeDocument/2006/relationships" type="twoObjAndObj" preserve="1">
   <p:cSld name="Title, 2 Content and Content">
     <p:spTree>
       <p:nvGrpSpPr>
@@ -952,7 +825,7 @@
       </p:grpSpPr>
       <p:sp>
         <p:nvSpPr>
-          <p:cNvPr id="12" name="PlaceHolder 1"/>
+          <p:cNvPr id="49" name="PlaceHolder 1"/>
           <p:cNvSpPr>
             <a:spLocks noGrp="1"/>
           </p:cNvSpPr>
@@ -970,17 +843,15 @@
           </a:prstGeom>
         </p:spPr>
         <p:txBody>
-          <a:bodyPr lIns="0" tIns="0" rIns="0" bIns="0" anchor="ctr"/>
-          <a:lstStyle/>
-          <a:p>
-            <a:pPr algn="ctr"/>
-            <a:endParaRPr/>
-          </a:p>
-        </p:txBody>
-      </p:sp>
-      <p:sp>
-        <p:nvSpPr>
-          <p:cNvPr id="13" name="PlaceHolder 2"/>
+          <a:bodyPr lIns="0" rIns="0" tIns="0" bIns="0" anchor="ctr"/>
+          <a:p>
+            <a:endParaRPr/>
+          </a:p>
+        </p:txBody>
+      </p:sp>
+      <p:sp>
+        <p:nvSpPr>
+          <p:cNvPr id="50" name="PlaceHolder 2"/>
           <p:cNvSpPr>
             <a:spLocks noGrp="1"/>
           </p:cNvSpPr>
@@ -998,16 +869,15 @@
           </a:prstGeom>
         </p:spPr>
         <p:txBody>
-          <a:bodyPr lIns="0" tIns="0" rIns="0" bIns="0"/>
-          <a:lstStyle/>
-          <a:p>
-            <a:endParaRPr/>
-          </a:p>
-        </p:txBody>
-      </p:sp>
-      <p:sp>
-        <p:nvSpPr>
-          <p:cNvPr id="14" name="PlaceHolder 3"/>
+          <a:bodyPr lIns="0" rIns="0" tIns="0" bIns="0"/>
+          <a:p>
+            <a:endParaRPr/>
+          </a:p>
+        </p:txBody>
+      </p:sp>
+      <p:sp>
+        <p:nvSpPr>
+          <p:cNvPr id="51" name="PlaceHolder 3"/>
           <p:cNvSpPr>
             <a:spLocks noGrp="1"/>
           </p:cNvSpPr>
@@ -1025,16 +895,15 @@
           </a:prstGeom>
         </p:spPr>
         <p:txBody>
-          <a:bodyPr lIns="0" tIns="0" rIns="0" bIns="0"/>
-          <a:lstStyle/>
-          <a:p>
-            <a:endParaRPr/>
-          </a:p>
-        </p:txBody>
-      </p:sp>
-      <p:sp>
-        <p:nvSpPr>
-          <p:cNvPr id="15" name="PlaceHolder 4"/>
+          <a:bodyPr lIns="0" rIns="0" tIns="0" bIns="0"/>
+          <a:p>
+            <a:endParaRPr/>
+          </a:p>
+        </p:txBody>
+      </p:sp>
+      <p:sp>
+        <p:nvSpPr>
+          <p:cNvPr id="52" name="PlaceHolder 4"/>
           <p:cNvSpPr>
             <a:spLocks noGrp="1"/>
           </p:cNvSpPr>
@@ -1052,8 +921,7 @@
           </a:prstGeom>
         </p:spPr>
         <p:txBody>
-          <a:bodyPr lIns="0" tIns="0" rIns="0" bIns="0"/>
-          <a:lstStyle/>
+          <a:bodyPr lIns="0" rIns="0" tIns="0" bIns="0"/>
           <a:p>
             <a:endParaRPr/>
           </a:p>
@@ -1061,14 +929,86 @@
       </p:sp>
     </p:spTree>
   </p:cSld>
-  <p:clrMapOvr>
-    <a:masterClrMapping/>
-  </p:clrMapOvr>
 </p:sldLayout>
 </file>
 
-<file path=ppt/slideLayouts/slideLayout8.xml><?xml version="1.0" encoding="utf-8"?>
-<p:sldLayout xmlns:a="http://schemas.openxmlformats.org/drawingml/2006/main" xmlns:r="http://schemas.openxmlformats.org/officeDocument/2006/relationships" xmlns:p="http://schemas.openxmlformats.org/presentationml/2006/main" type="objAndTwoObj" preserve="1">
+<file path=ppt/slideLayouts/slideLayout2.xml><?xml version="1.0" encoding="utf-8"?>
+<p:sldLayout xmlns:a="http://schemas.openxmlformats.org/drawingml/2006/main" xmlns:p="http://schemas.openxmlformats.org/presentationml/2006/main" xmlns:r="http://schemas.openxmlformats.org/officeDocument/2006/relationships" type="tx" preserve="1">
+  <p:cSld name="Title Slide">
+    <p:spTree>
+      <p:nvGrpSpPr>
+        <p:cNvPr id="1" name=""/>
+        <p:cNvGrpSpPr/>
+        <p:nvPr/>
+      </p:nvGrpSpPr>
+      <p:grpSpPr>
+        <a:xfrm>
+          <a:off x="0" y="0"/>
+          <a:ext cx="0" cy="0"/>
+          <a:chOff x="0" y="0"/>
+          <a:chExt cx="0" cy="0"/>
+        </a:xfrm>
+      </p:grpSpPr>
+      <p:sp>
+        <p:nvSpPr>
+          <p:cNvPr id="3" name="PlaceHolder 1"/>
+          <p:cNvSpPr>
+            <a:spLocks noGrp="1"/>
+          </p:cNvSpPr>
+          <p:nvPr>
+            <p:ph type="title"/>
+          </p:nvPr>
+        </p:nvSpPr>
+        <p:spPr>
+          <a:xfrm>
+            <a:off x="457200" y="273600"/>
+            <a:ext cx="8229240" cy="1145160"/>
+          </a:xfrm>
+          <a:prstGeom prst="rect">
+            <a:avLst/>
+          </a:prstGeom>
+        </p:spPr>
+        <p:txBody>
+          <a:bodyPr lIns="0" rIns="0" tIns="0" bIns="0" anchor="ctr"/>
+          <a:p>
+            <a:endParaRPr/>
+          </a:p>
+        </p:txBody>
+      </p:sp>
+      <p:sp>
+        <p:nvSpPr>
+          <p:cNvPr id="4" name="PlaceHolder 2"/>
+          <p:cNvSpPr>
+            <a:spLocks noGrp="1"/>
+          </p:cNvSpPr>
+          <p:nvPr>
+            <p:ph type="subTitle"/>
+          </p:nvPr>
+        </p:nvSpPr>
+        <p:spPr>
+          <a:xfrm>
+            <a:off x="457200" y="1604520"/>
+            <a:ext cx="8229240" cy="3977640"/>
+          </a:xfrm>
+          <a:prstGeom prst="rect">
+            <a:avLst/>
+          </a:prstGeom>
+        </p:spPr>
+        <p:txBody>
+          <a:bodyPr lIns="0" rIns="0" tIns="0" bIns="0" anchor="ctr"/>
+          <a:p>
+            <a:pPr algn="ctr"/>
+            <a:endParaRPr/>
+          </a:p>
+        </p:txBody>
+      </p:sp>
+    </p:spTree>
+  </p:cSld>
+</p:sldLayout>
+</file>
+
+<file path=ppt/slideLayouts/slideLayout20.xml><?xml version="1.0" encoding="utf-8"?>
+<p:sldLayout xmlns:a="http://schemas.openxmlformats.org/drawingml/2006/main" xmlns:p="http://schemas.openxmlformats.org/presentationml/2006/main" xmlns:r="http://schemas.openxmlformats.org/officeDocument/2006/relationships" type="objAndTwoObj" preserve="1">
   <p:cSld name="Title Content and 2 Content">
     <p:spTree>
       <p:nvGrpSpPr>
@@ -1086,7 +1026,7 @@
       </p:grpSpPr>
       <p:sp>
         <p:nvSpPr>
-          <p:cNvPr id="16" name="PlaceHolder 1"/>
+          <p:cNvPr id="53" name="PlaceHolder 1"/>
           <p:cNvSpPr>
             <a:spLocks noGrp="1"/>
           </p:cNvSpPr>
@@ -1104,17 +1044,15 @@
           </a:prstGeom>
         </p:spPr>
         <p:txBody>
-          <a:bodyPr lIns="0" tIns="0" rIns="0" bIns="0" anchor="ctr"/>
-          <a:lstStyle/>
-          <a:p>
-            <a:pPr algn="ctr"/>
-            <a:endParaRPr/>
-          </a:p>
-        </p:txBody>
-      </p:sp>
-      <p:sp>
-        <p:nvSpPr>
-          <p:cNvPr id="17" name="PlaceHolder 2"/>
+          <a:bodyPr lIns="0" rIns="0" tIns="0" bIns="0" anchor="ctr"/>
+          <a:p>
+            <a:endParaRPr/>
+          </a:p>
+        </p:txBody>
+      </p:sp>
+      <p:sp>
+        <p:nvSpPr>
+          <p:cNvPr id="54" name="PlaceHolder 2"/>
           <p:cNvSpPr>
             <a:spLocks noGrp="1"/>
           </p:cNvSpPr>
@@ -1132,16 +1070,15 @@
           </a:prstGeom>
         </p:spPr>
         <p:txBody>
-          <a:bodyPr lIns="0" tIns="0" rIns="0" bIns="0"/>
-          <a:lstStyle/>
-          <a:p>
-            <a:endParaRPr/>
-          </a:p>
-        </p:txBody>
-      </p:sp>
-      <p:sp>
-        <p:nvSpPr>
-          <p:cNvPr id="18" name="PlaceHolder 3"/>
+          <a:bodyPr lIns="0" rIns="0" tIns="0" bIns="0"/>
+          <a:p>
+            <a:endParaRPr/>
+          </a:p>
+        </p:txBody>
+      </p:sp>
+      <p:sp>
+        <p:nvSpPr>
+          <p:cNvPr id="55" name="PlaceHolder 3"/>
           <p:cNvSpPr>
             <a:spLocks noGrp="1"/>
           </p:cNvSpPr>
@@ -1159,16 +1096,15 @@
           </a:prstGeom>
         </p:spPr>
         <p:txBody>
-          <a:bodyPr lIns="0" tIns="0" rIns="0" bIns="0"/>
-          <a:lstStyle/>
-          <a:p>
-            <a:endParaRPr/>
-          </a:p>
-        </p:txBody>
-      </p:sp>
-      <p:sp>
-        <p:nvSpPr>
-          <p:cNvPr id="19" name="PlaceHolder 4"/>
+          <a:bodyPr lIns="0" rIns="0" tIns="0" bIns="0"/>
+          <a:p>
+            <a:endParaRPr/>
+          </a:p>
+        </p:txBody>
+      </p:sp>
+      <p:sp>
+        <p:nvSpPr>
+          <p:cNvPr id="56" name="PlaceHolder 4"/>
           <p:cNvSpPr>
             <a:spLocks noGrp="1"/>
           </p:cNvSpPr>
@@ -1186,8 +1122,7 @@
           </a:prstGeom>
         </p:spPr>
         <p:txBody>
-          <a:bodyPr lIns="0" tIns="0" rIns="0" bIns="0"/>
-          <a:lstStyle/>
+          <a:bodyPr lIns="0" rIns="0" tIns="0" bIns="0"/>
           <a:p>
             <a:endParaRPr/>
           </a:p>
@@ -1195,14 +1130,11 @@
       </p:sp>
     </p:spTree>
   </p:cSld>
-  <p:clrMapOvr>
-    <a:masterClrMapping/>
-  </p:clrMapOvr>
 </p:sldLayout>
 </file>
 
-<file path=ppt/slideLayouts/slideLayout9.xml><?xml version="1.0" encoding="utf-8"?>
-<p:sldLayout xmlns:a="http://schemas.openxmlformats.org/drawingml/2006/main" xmlns:r="http://schemas.openxmlformats.org/officeDocument/2006/relationships" xmlns:p="http://schemas.openxmlformats.org/presentationml/2006/main" type="twoObjOverTx" preserve="1">
+<file path=ppt/slideLayouts/slideLayout21.xml><?xml version="1.0" encoding="utf-8"?>
+<p:sldLayout xmlns:a="http://schemas.openxmlformats.org/drawingml/2006/main" xmlns:p="http://schemas.openxmlformats.org/presentationml/2006/main" xmlns:r="http://schemas.openxmlformats.org/officeDocument/2006/relationships" type="twoObjOverTx" preserve="1">
   <p:cSld name="Title, 2 Content over Content">
     <p:spTree>
       <p:nvGrpSpPr>
@@ -1220,7 +1152,7 @@
       </p:grpSpPr>
       <p:sp>
         <p:nvSpPr>
-          <p:cNvPr id="20" name="PlaceHolder 1"/>
+          <p:cNvPr id="57" name="PlaceHolder 1"/>
           <p:cNvSpPr>
             <a:spLocks noGrp="1"/>
           </p:cNvSpPr>
@@ -1238,17 +1170,15 @@
           </a:prstGeom>
         </p:spPr>
         <p:txBody>
-          <a:bodyPr lIns="0" tIns="0" rIns="0" bIns="0" anchor="ctr"/>
-          <a:lstStyle/>
-          <a:p>
-            <a:pPr algn="ctr"/>
-            <a:endParaRPr/>
-          </a:p>
-        </p:txBody>
-      </p:sp>
-      <p:sp>
-        <p:nvSpPr>
-          <p:cNvPr id="21" name="PlaceHolder 2"/>
+          <a:bodyPr lIns="0" rIns="0" tIns="0" bIns="0" anchor="ctr"/>
+          <a:p>
+            <a:endParaRPr/>
+          </a:p>
+        </p:txBody>
+      </p:sp>
+      <p:sp>
+        <p:nvSpPr>
+          <p:cNvPr id="58" name="PlaceHolder 2"/>
           <p:cNvSpPr>
             <a:spLocks noGrp="1"/>
           </p:cNvSpPr>
@@ -1266,16 +1196,15 @@
           </a:prstGeom>
         </p:spPr>
         <p:txBody>
-          <a:bodyPr lIns="0" tIns="0" rIns="0" bIns="0"/>
-          <a:lstStyle/>
-          <a:p>
-            <a:endParaRPr/>
-          </a:p>
-        </p:txBody>
-      </p:sp>
-      <p:sp>
-        <p:nvSpPr>
-          <p:cNvPr id="22" name="PlaceHolder 3"/>
+          <a:bodyPr lIns="0" rIns="0" tIns="0" bIns="0"/>
+          <a:p>
+            <a:endParaRPr/>
+          </a:p>
+        </p:txBody>
+      </p:sp>
+      <p:sp>
+        <p:nvSpPr>
+          <p:cNvPr id="59" name="PlaceHolder 3"/>
           <p:cNvSpPr>
             <a:spLocks noGrp="1"/>
           </p:cNvSpPr>
@@ -1293,16 +1222,15 @@
           </a:prstGeom>
         </p:spPr>
         <p:txBody>
-          <a:bodyPr lIns="0" tIns="0" rIns="0" bIns="0"/>
-          <a:lstStyle/>
-          <a:p>
-            <a:endParaRPr/>
-          </a:p>
-        </p:txBody>
-      </p:sp>
-      <p:sp>
-        <p:nvSpPr>
-          <p:cNvPr id="23" name="PlaceHolder 4"/>
+          <a:bodyPr lIns="0" rIns="0" tIns="0" bIns="0"/>
+          <a:p>
+            <a:endParaRPr/>
+          </a:p>
+        </p:txBody>
+      </p:sp>
+      <p:sp>
+        <p:nvSpPr>
+          <p:cNvPr id="60" name="PlaceHolder 4"/>
           <p:cNvSpPr>
             <a:spLocks noGrp="1"/>
           </p:cNvSpPr>
@@ -1320,8 +1248,7 @@
           </a:prstGeom>
         </p:spPr>
         <p:txBody>
-          <a:bodyPr lIns="0" tIns="0" rIns="0" bIns="0"/>
-          <a:lstStyle/>
+          <a:bodyPr lIns="0" rIns="0" tIns="0" bIns="0"/>
           <a:p>
             <a:endParaRPr/>
           </a:p>
@@ -1329,21 +1256,1068 @@
       </p:sp>
     </p:spTree>
   </p:cSld>
-  <p:clrMapOvr>
-    <a:masterClrMapping/>
-  </p:clrMapOvr>
+</p:sldLayout>
+</file>
+
+<file path=ppt/slideLayouts/slideLayout22.xml><?xml version="1.0" encoding="utf-8"?>
+<p:sldLayout xmlns:a="http://schemas.openxmlformats.org/drawingml/2006/main" xmlns:p="http://schemas.openxmlformats.org/presentationml/2006/main" xmlns:r="http://schemas.openxmlformats.org/officeDocument/2006/relationships" type="objOverTx" preserve="1">
+  <p:cSld name="Title, Content over Content">
+    <p:spTree>
+      <p:nvGrpSpPr>
+        <p:cNvPr id="1" name=""/>
+        <p:cNvGrpSpPr/>
+        <p:nvPr/>
+      </p:nvGrpSpPr>
+      <p:grpSpPr>
+        <a:xfrm>
+          <a:off x="0" y="0"/>
+          <a:ext cx="0" cy="0"/>
+          <a:chOff x="0" y="0"/>
+          <a:chExt cx="0" cy="0"/>
+        </a:xfrm>
+      </p:grpSpPr>
+      <p:sp>
+        <p:nvSpPr>
+          <p:cNvPr id="61" name="PlaceHolder 1"/>
+          <p:cNvSpPr>
+            <a:spLocks noGrp="1"/>
+          </p:cNvSpPr>
+          <p:nvPr>
+            <p:ph type="title"/>
+          </p:nvPr>
+        </p:nvSpPr>
+        <p:spPr>
+          <a:xfrm>
+            <a:off x="457200" y="273600"/>
+            <a:ext cx="8229240" cy="1145160"/>
+          </a:xfrm>
+          <a:prstGeom prst="rect">
+            <a:avLst/>
+          </a:prstGeom>
+        </p:spPr>
+        <p:txBody>
+          <a:bodyPr lIns="0" rIns="0" tIns="0" bIns="0" anchor="ctr"/>
+          <a:p>
+            <a:endParaRPr/>
+          </a:p>
+        </p:txBody>
+      </p:sp>
+      <p:sp>
+        <p:nvSpPr>
+          <p:cNvPr id="62" name="PlaceHolder 2"/>
+          <p:cNvSpPr>
+            <a:spLocks noGrp="1"/>
+          </p:cNvSpPr>
+          <p:nvPr>
+            <p:ph type="body"/>
+          </p:nvPr>
+        </p:nvSpPr>
+        <p:spPr>
+          <a:xfrm>
+            <a:off x="457200" y="1604520"/>
+            <a:ext cx="8229240" cy="1896840"/>
+          </a:xfrm>
+          <a:prstGeom prst="rect">
+            <a:avLst/>
+          </a:prstGeom>
+        </p:spPr>
+        <p:txBody>
+          <a:bodyPr lIns="0" rIns="0" tIns="0" bIns="0"/>
+          <a:p>
+            <a:endParaRPr/>
+          </a:p>
+        </p:txBody>
+      </p:sp>
+      <p:sp>
+        <p:nvSpPr>
+          <p:cNvPr id="63" name="PlaceHolder 3"/>
+          <p:cNvSpPr>
+            <a:spLocks noGrp="1"/>
+          </p:cNvSpPr>
+          <p:nvPr>
+            <p:ph type="body"/>
+          </p:nvPr>
+        </p:nvSpPr>
+        <p:spPr>
+          <a:xfrm>
+            <a:off x="457200" y="3682080"/>
+            <a:ext cx="8229240" cy="1896840"/>
+          </a:xfrm>
+          <a:prstGeom prst="rect">
+            <a:avLst/>
+          </a:prstGeom>
+        </p:spPr>
+        <p:txBody>
+          <a:bodyPr lIns="0" rIns="0" tIns="0" bIns="0"/>
+          <a:p>
+            <a:endParaRPr/>
+          </a:p>
+        </p:txBody>
+      </p:sp>
+    </p:spTree>
+  </p:cSld>
+</p:sldLayout>
+</file>
+
+<file path=ppt/slideLayouts/slideLayout23.xml><?xml version="1.0" encoding="utf-8"?>
+<p:sldLayout xmlns:a="http://schemas.openxmlformats.org/drawingml/2006/main" xmlns:p="http://schemas.openxmlformats.org/presentationml/2006/main" xmlns:r="http://schemas.openxmlformats.org/officeDocument/2006/relationships" type="fourObj" preserve="1">
+  <p:cSld name="Title, 4 Content">
+    <p:spTree>
+      <p:nvGrpSpPr>
+        <p:cNvPr id="1" name=""/>
+        <p:cNvGrpSpPr/>
+        <p:nvPr/>
+      </p:nvGrpSpPr>
+      <p:grpSpPr>
+        <a:xfrm>
+          <a:off x="0" y="0"/>
+          <a:ext cx="0" cy="0"/>
+          <a:chOff x="0" y="0"/>
+          <a:chExt cx="0" cy="0"/>
+        </a:xfrm>
+      </p:grpSpPr>
+      <p:sp>
+        <p:nvSpPr>
+          <p:cNvPr id="64" name="PlaceHolder 1"/>
+          <p:cNvSpPr>
+            <a:spLocks noGrp="1"/>
+          </p:cNvSpPr>
+          <p:nvPr>
+            <p:ph type="title"/>
+          </p:nvPr>
+        </p:nvSpPr>
+        <p:spPr>
+          <a:xfrm>
+            <a:off x="457200" y="273600"/>
+            <a:ext cx="8229240" cy="1145160"/>
+          </a:xfrm>
+          <a:prstGeom prst="rect">
+            <a:avLst/>
+          </a:prstGeom>
+        </p:spPr>
+        <p:txBody>
+          <a:bodyPr lIns="0" rIns="0" tIns="0" bIns="0" anchor="ctr"/>
+          <a:p>
+            <a:endParaRPr/>
+          </a:p>
+        </p:txBody>
+      </p:sp>
+      <p:sp>
+        <p:nvSpPr>
+          <p:cNvPr id="65" name="PlaceHolder 2"/>
+          <p:cNvSpPr>
+            <a:spLocks noGrp="1"/>
+          </p:cNvSpPr>
+          <p:nvPr>
+            <p:ph type="body"/>
+          </p:nvPr>
+        </p:nvSpPr>
+        <p:spPr>
+          <a:xfrm>
+            <a:off x="457200" y="1604520"/>
+            <a:ext cx="4015800" cy="1896840"/>
+          </a:xfrm>
+          <a:prstGeom prst="rect">
+            <a:avLst/>
+          </a:prstGeom>
+        </p:spPr>
+        <p:txBody>
+          <a:bodyPr lIns="0" rIns="0" tIns="0" bIns="0"/>
+          <a:p>
+            <a:endParaRPr/>
+          </a:p>
+        </p:txBody>
+      </p:sp>
+      <p:sp>
+        <p:nvSpPr>
+          <p:cNvPr id="66" name="PlaceHolder 3"/>
+          <p:cNvSpPr>
+            <a:spLocks noGrp="1"/>
+          </p:cNvSpPr>
+          <p:nvPr>
+            <p:ph type="body"/>
+          </p:nvPr>
+        </p:nvSpPr>
+        <p:spPr>
+          <a:xfrm>
+            <a:off x="4674240" y="1604520"/>
+            <a:ext cx="4015800" cy="1896840"/>
+          </a:xfrm>
+          <a:prstGeom prst="rect">
+            <a:avLst/>
+          </a:prstGeom>
+        </p:spPr>
+        <p:txBody>
+          <a:bodyPr lIns="0" rIns="0" tIns="0" bIns="0"/>
+          <a:p>
+            <a:endParaRPr/>
+          </a:p>
+        </p:txBody>
+      </p:sp>
+      <p:sp>
+        <p:nvSpPr>
+          <p:cNvPr id="67" name="PlaceHolder 4"/>
+          <p:cNvSpPr>
+            <a:spLocks noGrp="1"/>
+          </p:cNvSpPr>
+          <p:nvPr>
+            <p:ph type="body"/>
+          </p:nvPr>
+        </p:nvSpPr>
+        <p:spPr>
+          <a:xfrm>
+            <a:off x="4674240" y="3682080"/>
+            <a:ext cx="4015800" cy="1896840"/>
+          </a:xfrm>
+          <a:prstGeom prst="rect">
+            <a:avLst/>
+          </a:prstGeom>
+        </p:spPr>
+        <p:txBody>
+          <a:bodyPr lIns="0" rIns="0" tIns="0" bIns="0"/>
+          <a:p>
+            <a:endParaRPr/>
+          </a:p>
+        </p:txBody>
+      </p:sp>
+      <p:sp>
+        <p:nvSpPr>
+          <p:cNvPr id="68" name="PlaceHolder 5"/>
+          <p:cNvSpPr>
+            <a:spLocks noGrp="1"/>
+          </p:cNvSpPr>
+          <p:nvPr>
+            <p:ph type="body"/>
+          </p:nvPr>
+        </p:nvSpPr>
+        <p:spPr>
+          <a:xfrm>
+            <a:off x="457200" y="3682080"/>
+            <a:ext cx="4015800" cy="1896840"/>
+          </a:xfrm>
+          <a:prstGeom prst="rect">
+            <a:avLst/>
+          </a:prstGeom>
+        </p:spPr>
+        <p:txBody>
+          <a:bodyPr lIns="0" rIns="0" tIns="0" bIns="0"/>
+          <a:p>
+            <a:endParaRPr/>
+          </a:p>
+        </p:txBody>
+      </p:sp>
+    </p:spTree>
+  </p:cSld>
+</p:sldLayout>
+</file>
+
+<file path=ppt/slideLayouts/slideLayout24.xml><?xml version="1.0" encoding="utf-8"?>
+<p:sldLayout xmlns:a="http://schemas.openxmlformats.org/drawingml/2006/main" xmlns:p="http://schemas.openxmlformats.org/presentationml/2006/main" xmlns:r="http://schemas.openxmlformats.org/officeDocument/2006/relationships" type="blank" preserve="1">
+  <p:cSld name="Title, 6 Content">
+    <p:spTree>
+      <p:nvGrpSpPr>
+        <p:cNvPr id="1" name=""/>
+        <p:cNvGrpSpPr/>
+        <p:nvPr/>
+      </p:nvGrpSpPr>
+      <p:grpSpPr>
+        <a:xfrm>
+          <a:off x="0" y="0"/>
+          <a:ext cx="0" cy="0"/>
+          <a:chOff x="0" y="0"/>
+          <a:chExt cx="0" cy="0"/>
+        </a:xfrm>
+      </p:grpSpPr>
+      <p:sp>
+        <p:nvSpPr>
+          <p:cNvPr id="69" name="PlaceHolder 1"/>
+          <p:cNvSpPr>
+            <a:spLocks noGrp="1"/>
+          </p:cNvSpPr>
+          <p:nvPr>
+            <p:ph type="title"/>
+          </p:nvPr>
+        </p:nvSpPr>
+        <p:spPr>
+          <a:xfrm>
+            <a:off x="457200" y="273600"/>
+            <a:ext cx="8229240" cy="1145160"/>
+          </a:xfrm>
+          <a:prstGeom prst="rect">
+            <a:avLst/>
+          </a:prstGeom>
+        </p:spPr>
+        <p:txBody>
+          <a:bodyPr lIns="0" rIns="0" tIns="0" bIns="0" anchor="ctr"/>
+          <a:p>
+            <a:endParaRPr/>
+          </a:p>
+        </p:txBody>
+      </p:sp>
+      <p:sp>
+        <p:nvSpPr>
+          <p:cNvPr id="70" name="PlaceHolder 2"/>
+          <p:cNvSpPr>
+            <a:spLocks noGrp="1"/>
+          </p:cNvSpPr>
+          <p:nvPr>
+            <p:ph type="body"/>
+          </p:nvPr>
+        </p:nvSpPr>
+        <p:spPr>
+          <a:xfrm>
+            <a:off x="457200" y="1604520"/>
+            <a:ext cx="8229240" cy="3977280"/>
+          </a:xfrm>
+          <a:prstGeom prst="rect">
+            <a:avLst/>
+          </a:prstGeom>
+        </p:spPr>
+        <p:txBody>
+          <a:bodyPr lIns="0" rIns="0" tIns="0" bIns="0"/>
+          <a:p>
+            <a:endParaRPr/>
+          </a:p>
+        </p:txBody>
+      </p:sp>
+      <p:sp>
+        <p:nvSpPr>
+          <p:cNvPr id="71" name="PlaceHolder 3"/>
+          <p:cNvSpPr>
+            <a:spLocks noGrp="1"/>
+          </p:cNvSpPr>
+          <p:nvPr>
+            <p:ph type="body"/>
+          </p:nvPr>
+        </p:nvSpPr>
+        <p:spPr>
+          <a:xfrm>
+            <a:off x="457200" y="1604520"/>
+            <a:ext cx="8229240" cy="3977280"/>
+          </a:xfrm>
+          <a:prstGeom prst="rect">
+            <a:avLst/>
+          </a:prstGeom>
+        </p:spPr>
+        <p:txBody>
+          <a:bodyPr lIns="0" rIns="0" tIns="0" bIns="0"/>
+          <a:p>
+            <a:endParaRPr/>
+          </a:p>
+        </p:txBody>
+      </p:sp>
+      <p:pic>
+        <p:nvPicPr>
+          <p:cNvPr id="72" name="" descr=""/>
+          <p:cNvPicPr/>
+          <p:nvPr/>
+        </p:nvPicPr>
+        <p:blipFill>
+          <a:blip r:embed="rId2"/>
+          <a:stretch>
+            <a:fillRect/>
+          </a:stretch>
+        </p:blipFill>
+        <p:spPr>
+          <a:xfrm>
+            <a:off x="2079000" y="1604520"/>
+            <a:ext cx="4984920" cy="3977280"/>
+          </a:xfrm>
+          <a:prstGeom prst="rect">
+            <a:avLst/>
+          </a:prstGeom>
+          <a:ln>
+            <a:noFill/>
+          </a:ln>
+        </p:spPr>
+      </p:pic>
+      <p:pic>
+        <p:nvPicPr>
+          <p:cNvPr id="73" name="" descr=""/>
+          <p:cNvPicPr/>
+          <p:nvPr/>
+        </p:nvPicPr>
+        <p:blipFill>
+          <a:blip r:embed="rId3"/>
+          <a:stretch>
+            <a:fillRect/>
+          </a:stretch>
+        </p:blipFill>
+        <p:spPr>
+          <a:xfrm>
+            <a:off x="2079000" y="1604520"/>
+            <a:ext cx="4984920" cy="3977280"/>
+          </a:xfrm>
+          <a:prstGeom prst="rect">
+            <a:avLst/>
+          </a:prstGeom>
+          <a:ln>
+            <a:noFill/>
+          </a:ln>
+        </p:spPr>
+      </p:pic>
+    </p:spTree>
+  </p:cSld>
+</p:sldLayout>
+</file>
+
+<file path=ppt/slideLayouts/slideLayout3.xml><?xml version="1.0" encoding="utf-8"?>
+<p:sldLayout xmlns:a="http://schemas.openxmlformats.org/drawingml/2006/main" xmlns:p="http://schemas.openxmlformats.org/presentationml/2006/main" xmlns:r="http://schemas.openxmlformats.org/officeDocument/2006/relationships" type="obj" preserve="1">
+  <p:cSld name="Title, Content">
+    <p:spTree>
+      <p:nvGrpSpPr>
+        <p:cNvPr id="1" name=""/>
+        <p:cNvGrpSpPr/>
+        <p:nvPr/>
+      </p:nvGrpSpPr>
+      <p:grpSpPr>
+        <a:xfrm>
+          <a:off x="0" y="0"/>
+          <a:ext cx="0" cy="0"/>
+          <a:chOff x="0" y="0"/>
+          <a:chExt cx="0" cy="0"/>
+        </a:xfrm>
+      </p:grpSpPr>
+      <p:sp>
+        <p:nvSpPr>
+          <p:cNvPr id="5" name="PlaceHolder 1"/>
+          <p:cNvSpPr>
+            <a:spLocks noGrp="1"/>
+          </p:cNvSpPr>
+          <p:nvPr>
+            <p:ph type="title"/>
+          </p:nvPr>
+        </p:nvSpPr>
+        <p:spPr>
+          <a:xfrm>
+            <a:off x="457200" y="273600"/>
+            <a:ext cx="8229240" cy="1145160"/>
+          </a:xfrm>
+          <a:prstGeom prst="rect">
+            <a:avLst/>
+          </a:prstGeom>
+        </p:spPr>
+        <p:txBody>
+          <a:bodyPr lIns="0" rIns="0" tIns="0" bIns="0" anchor="ctr"/>
+          <a:p>
+            <a:endParaRPr/>
+          </a:p>
+        </p:txBody>
+      </p:sp>
+      <p:sp>
+        <p:nvSpPr>
+          <p:cNvPr id="6" name="PlaceHolder 2"/>
+          <p:cNvSpPr>
+            <a:spLocks noGrp="1"/>
+          </p:cNvSpPr>
+          <p:nvPr>
+            <p:ph type="body"/>
+          </p:nvPr>
+        </p:nvSpPr>
+        <p:spPr>
+          <a:xfrm>
+            <a:off x="457200" y="1604520"/>
+            <a:ext cx="8229240" cy="3977280"/>
+          </a:xfrm>
+          <a:prstGeom prst="rect">
+            <a:avLst/>
+          </a:prstGeom>
+        </p:spPr>
+        <p:txBody>
+          <a:bodyPr lIns="0" rIns="0" tIns="0" bIns="0"/>
+          <a:p>
+            <a:endParaRPr/>
+          </a:p>
+        </p:txBody>
+      </p:sp>
+    </p:spTree>
+  </p:cSld>
+</p:sldLayout>
+</file>
+
+<file path=ppt/slideLayouts/slideLayout4.xml><?xml version="1.0" encoding="utf-8"?>
+<p:sldLayout xmlns:a="http://schemas.openxmlformats.org/drawingml/2006/main" xmlns:p="http://schemas.openxmlformats.org/presentationml/2006/main" xmlns:r="http://schemas.openxmlformats.org/officeDocument/2006/relationships" type="twoObj" preserve="1">
+  <p:cSld name="Title, 2 Content">
+    <p:spTree>
+      <p:nvGrpSpPr>
+        <p:cNvPr id="1" name=""/>
+        <p:cNvGrpSpPr/>
+        <p:nvPr/>
+      </p:nvGrpSpPr>
+      <p:grpSpPr>
+        <a:xfrm>
+          <a:off x="0" y="0"/>
+          <a:ext cx="0" cy="0"/>
+          <a:chOff x="0" y="0"/>
+          <a:chExt cx="0" cy="0"/>
+        </a:xfrm>
+      </p:grpSpPr>
+      <p:sp>
+        <p:nvSpPr>
+          <p:cNvPr id="7" name="PlaceHolder 1"/>
+          <p:cNvSpPr>
+            <a:spLocks noGrp="1"/>
+          </p:cNvSpPr>
+          <p:nvPr>
+            <p:ph type="title"/>
+          </p:nvPr>
+        </p:nvSpPr>
+        <p:spPr>
+          <a:xfrm>
+            <a:off x="457200" y="273600"/>
+            <a:ext cx="8229240" cy="1145160"/>
+          </a:xfrm>
+          <a:prstGeom prst="rect">
+            <a:avLst/>
+          </a:prstGeom>
+        </p:spPr>
+        <p:txBody>
+          <a:bodyPr lIns="0" rIns="0" tIns="0" bIns="0" anchor="ctr"/>
+          <a:p>
+            <a:endParaRPr/>
+          </a:p>
+        </p:txBody>
+      </p:sp>
+      <p:sp>
+        <p:nvSpPr>
+          <p:cNvPr id="8" name="PlaceHolder 2"/>
+          <p:cNvSpPr>
+            <a:spLocks noGrp="1"/>
+          </p:cNvSpPr>
+          <p:nvPr>
+            <p:ph type="body"/>
+          </p:nvPr>
+        </p:nvSpPr>
+        <p:spPr>
+          <a:xfrm>
+            <a:off x="457200" y="1604520"/>
+            <a:ext cx="4015800" cy="3977280"/>
+          </a:xfrm>
+          <a:prstGeom prst="rect">
+            <a:avLst/>
+          </a:prstGeom>
+        </p:spPr>
+        <p:txBody>
+          <a:bodyPr lIns="0" rIns="0" tIns="0" bIns="0"/>
+          <a:p>
+            <a:endParaRPr/>
+          </a:p>
+        </p:txBody>
+      </p:sp>
+      <p:sp>
+        <p:nvSpPr>
+          <p:cNvPr id="9" name="PlaceHolder 3"/>
+          <p:cNvSpPr>
+            <a:spLocks noGrp="1"/>
+          </p:cNvSpPr>
+          <p:nvPr>
+            <p:ph type="body"/>
+          </p:nvPr>
+        </p:nvSpPr>
+        <p:spPr>
+          <a:xfrm>
+            <a:off x="4674240" y="1604520"/>
+            <a:ext cx="4015800" cy="3977280"/>
+          </a:xfrm>
+          <a:prstGeom prst="rect">
+            <a:avLst/>
+          </a:prstGeom>
+        </p:spPr>
+        <p:txBody>
+          <a:bodyPr lIns="0" rIns="0" tIns="0" bIns="0"/>
+          <a:p>
+            <a:endParaRPr/>
+          </a:p>
+        </p:txBody>
+      </p:sp>
+    </p:spTree>
+  </p:cSld>
+</p:sldLayout>
+</file>
+
+<file path=ppt/slideLayouts/slideLayout5.xml><?xml version="1.0" encoding="utf-8"?>
+<p:sldLayout xmlns:a="http://schemas.openxmlformats.org/drawingml/2006/main" xmlns:p="http://schemas.openxmlformats.org/presentationml/2006/main" xmlns:r="http://schemas.openxmlformats.org/officeDocument/2006/relationships" type="titleOnly" preserve="1">
+  <p:cSld name="Title Only">
+    <p:spTree>
+      <p:nvGrpSpPr>
+        <p:cNvPr id="1" name=""/>
+        <p:cNvGrpSpPr/>
+        <p:nvPr/>
+      </p:nvGrpSpPr>
+      <p:grpSpPr>
+        <a:xfrm>
+          <a:off x="0" y="0"/>
+          <a:ext cx="0" cy="0"/>
+          <a:chOff x="0" y="0"/>
+          <a:chExt cx="0" cy="0"/>
+        </a:xfrm>
+      </p:grpSpPr>
+      <p:sp>
+        <p:nvSpPr>
+          <p:cNvPr id="10" name="PlaceHolder 1"/>
+          <p:cNvSpPr>
+            <a:spLocks noGrp="1"/>
+          </p:cNvSpPr>
+          <p:nvPr>
+            <p:ph type="title"/>
+          </p:nvPr>
+        </p:nvSpPr>
+        <p:spPr>
+          <a:xfrm>
+            <a:off x="457200" y="273600"/>
+            <a:ext cx="8229240" cy="1145160"/>
+          </a:xfrm>
+          <a:prstGeom prst="rect">
+            <a:avLst/>
+          </a:prstGeom>
+        </p:spPr>
+        <p:txBody>
+          <a:bodyPr lIns="0" rIns="0" tIns="0" bIns="0" anchor="ctr"/>
+          <a:p>
+            <a:endParaRPr/>
+          </a:p>
+        </p:txBody>
+      </p:sp>
+    </p:spTree>
+  </p:cSld>
+</p:sldLayout>
+</file>
+
+<file path=ppt/slideLayouts/slideLayout6.xml><?xml version="1.0" encoding="utf-8"?>
+<p:sldLayout xmlns:a="http://schemas.openxmlformats.org/drawingml/2006/main" xmlns:p="http://schemas.openxmlformats.org/presentationml/2006/main" xmlns:r="http://schemas.openxmlformats.org/officeDocument/2006/relationships" type="objOnly" preserve="1">
+  <p:cSld name="Centered Text">
+    <p:spTree>
+      <p:nvGrpSpPr>
+        <p:cNvPr id="1" name=""/>
+        <p:cNvGrpSpPr/>
+        <p:nvPr/>
+      </p:nvGrpSpPr>
+      <p:grpSpPr>
+        <a:xfrm>
+          <a:off x="0" y="0"/>
+          <a:ext cx="0" cy="0"/>
+          <a:chOff x="0" y="0"/>
+          <a:chExt cx="0" cy="0"/>
+        </a:xfrm>
+      </p:grpSpPr>
+      <p:sp>
+        <p:nvSpPr>
+          <p:cNvPr id="11" name="PlaceHolder 1"/>
+          <p:cNvSpPr>
+            <a:spLocks noGrp="1"/>
+          </p:cNvSpPr>
+          <p:nvPr>
+            <p:ph type="subTitle"/>
+          </p:nvPr>
+        </p:nvSpPr>
+        <p:spPr>
+          <a:xfrm>
+            <a:off x="457200" y="273600"/>
+            <a:ext cx="8229240" cy="5308200"/>
+          </a:xfrm>
+          <a:prstGeom prst="rect">
+            <a:avLst/>
+          </a:prstGeom>
+        </p:spPr>
+        <p:txBody>
+          <a:bodyPr lIns="0" rIns="0" tIns="0" bIns="0" anchor="ctr"/>
+          <a:p>
+            <a:pPr algn="ctr"/>
+            <a:endParaRPr/>
+          </a:p>
+        </p:txBody>
+      </p:sp>
+    </p:spTree>
+  </p:cSld>
+</p:sldLayout>
+</file>
+
+<file path=ppt/slideLayouts/slideLayout7.xml><?xml version="1.0" encoding="utf-8"?>
+<p:sldLayout xmlns:a="http://schemas.openxmlformats.org/drawingml/2006/main" xmlns:p="http://schemas.openxmlformats.org/presentationml/2006/main" xmlns:r="http://schemas.openxmlformats.org/officeDocument/2006/relationships" type="twoObjAndObj" preserve="1">
+  <p:cSld name="Title, 2 Content and Content">
+    <p:spTree>
+      <p:nvGrpSpPr>
+        <p:cNvPr id="1" name=""/>
+        <p:cNvGrpSpPr/>
+        <p:nvPr/>
+      </p:nvGrpSpPr>
+      <p:grpSpPr>
+        <a:xfrm>
+          <a:off x="0" y="0"/>
+          <a:ext cx="0" cy="0"/>
+          <a:chOff x="0" y="0"/>
+          <a:chExt cx="0" cy="0"/>
+        </a:xfrm>
+      </p:grpSpPr>
+      <p:sp>
+        <p:nvSpPr>
+          <p:cNvPr id="12" name="PlaceHolder 1"/>
+          <p:cNvSpPr>
+            <a:spLocks noGrp="1"/>
+          </p:cNvSpPr>
+          <p:nvPr>
+            <p:ph type="title"/>
+          </p:nvPr>
+        </p:nvSpPr>
+        <p:spPr>
+          <a:xfrm>
+            <a:off x="457200" y="273600"/>
+            <a:ext cx="8229240" cy="1145160"/>
+          </a:xfrm>
+          <a:prstGeom prst="rect">
+            <a:avLst/>
+          </a:prstGeom>
+        </p:spPr>
+        <p:txBody>
+          <a:bodyPr lIns="0" rIns="0" tIns="0" bIns="0" anchor="ctr"/>
+          <a:p>
+            <a:endParaRPr/>
+          </a:p>
+        </p:txBody>
+      </p:sp>
+      <p:sp>
+        <p:nvSpPr>
+          <p:cNvPr id="13" name="PlaceHolder 2"/>
+          <p:cNvSpPr>
+            <a:spLocks noGrp="1"/>
+          </p:cNvSpPr>
+          <p:nvPr>
+            <p:ph type="body"/>
+          </p:nvPr>
+        </p:nvSpPr>
+        <p:spPr>
+          <a:xfrm>
+            <a:off x="457200" y="1604520"/>
+            <a:ext cx="4015800" cy="1896840"/>
+          </a:xfrm>
+          <a:prstGeom prst="rect">
+            <a:avLst/>
+          </a:prstGeom>
+        </p:spPr>
+        <p:txBody>
+          <a:bodyPr lIns="0" rIns="0" tIns="0" bIns="0"/>
+          <a:p>
+            <a:endParaRPr/>
+          </a:p>
+        </p:txBody>
+      </p:sp>
+      <p:sp>
+        <p:nvSpPr>
+          <p:cNvPr id="14" name="PlaceHolder 3"/>
+          <p:cNvSpPr>
+            <a:spLocks noGrp="1"/>
+          </p:cNvSpPr>
+          <p:nvPr>
+            <p:ph type="body"/>
+          </p:nvPr>
+        </p:nvSpPr>
+        <p:spPr>
+          <a:xfrm>
+            <a:off x="457200" y="3682080"/>
+            <a:ext cx="4015800" cy="1896840"/>
+          </a:xfrm>
+          <a:prstGeom prst="rect">
+            <a:avLst/>
+          </a:prstGeom>
+        </p:spPr>
+        <p:txBody>
+          <a:bodyPr lIns="0" rIns="0" tIns="0" bIns="0"/>
+          <a:p>
+            <a:endParaRPr/>
+          </a:p>
+        </p:txBody>
+      </p:sp>
+      <p:sp>
+        <p:nvSpPr>
+          <p:cNvPr id="15" name="PlaceHolder 4"/>
+          <p:cNvSpPr>
+            <a:spLocks noGrp="1"/>
+          </p:cNvSpPr>
+          <p:nvPr>
+            <p:ph type="body"/>
+          </p:nvPr>
+        </p:nvSpPr>
+        <p:spPr>
+          <a:xfrm>
+            <a:off x="4674240" y="1604520"/>
+            <a:ext cx="4015800" cy="3977280"/>
+          </a:xfrm>
+          <a:prstGeom prst="rect">
+            <a:avLst/>
+          </a:prstGeom>
+        </p:spPr>
+        <p:txBody>
+          <a:bodyPr lIns="0" rIns="0" tIns="0" bIns="0"/>
+          <a:p>
+            <a:endParaRPr/>
+          </a:p>
+        </p:txBody>
+      </p:sp>
+    </p:spTree>
+  </p:cSld>
+</p:sldLayout>
+</file>
+
+<file path=ppt/slideLayouts/slideLayout8.xml><?xml version="1.0" encoding="utf-8"?>
+<p:sldLayout xmlns:a="http://schemas.openxmlformats.org/drawingml/2006/main" xmlns:p="http://schemas.openxmlformats.org/presentationml/2006/main" xmlns:r="http://schemas.openxmlformats.org/officeDocument/2006/relationships" type="objAndTwoObj" preserve="1">
+  <p:cSld name="Title Content and 2 Content">
+    <p:spTree>
+      <p:nvGrpSpPr>
+        <p:cNvPr id="1" name=""/>
+        <p:cNvGrpSpPr/>
+        <p:nvPr/>
+      </p:nvGrpSpPr>
+      <p:grpSpPr>
+        <a:xfrm>
+          <a:off x="0" y="0"/>
+          <a:ext cx="0" cy="0"/>
+          <a:chOff x="0" y="0"/>
+          <a:chExt cx="0" cy="0"/>
+        </a:xfrm>
+      </p:grpSpPr>
+      <p:sp>
+        <p:nvSpPr>
+          <p:cNvPr id="16" name="PlaceHolder 1"/>
+          <p:cNvSpPr>
+            <a:spLocks noGrp="1"/>
+          </p:cNvSpPr>
+          <p:nvPr>
+            <p:ph type="title"/>
+          </p:nvPr>
+        </p:nvSpPr>
+        <p:spPr>
+          <a:xfrm>
+            <a:off x="457200" y="273600"/>
+            <a:ext cx="8229240" cy="1145160"/>
+          </a:xfrm>
+          <a:prstGeom prst="rect">
+            <a:avLst/>
+          </a:prstGeom>
+        </p:spPr>
+        <p:txBody>
+          <a:bodyPr lIns="0" rIns="0" tIns="0" bIns="0" anchor="ctr"/>
+          <a:p>
+            <a:endParaRPr/>
+          </a:p>
+        </p:txBody>
+      </p:sp>
+      <p:sp>
+        <p:nvSpPr>
+          <p:cNvPr id="17" name="PlaceHolder 2"/>
+          <p:cNvSpPr>
+            <a:spLocks noGrp="1"/>
+          </p:cNvSpPr>
+          <p:nvPr>
+            <p:ph type="body"/>
+          </p:nvPr>
+        </p:nvSpPr>
+        <p:spPr>
+          <a:xfrm>
+            <a:off x="457200" y="1604520"/>
+            <a:ext cx="4015800" cy="3977280"/>
+          </a:xfrm>
+          <a:prstGeom prst="rect">
+            <a:avLst/>
+          </a:prstGeom>
+        </p:spPr>
+        <p:txBody>
+          <a:bodyPr lIns="0" rIns="0" tIns="0" bIns="0"/>
+          <a:p>
+            <a:endParaRPr/>
+          </a:p>
+        </p:txBody>
+      </p:sp>
+      <p:sp>
+        <p:nvSpPr>
+          <p:cNvPr id="18" name="PlaceHolder 3"/>
+          <p:cNvSpPr>
+            <a:spLocks noGrp="1"/>
+          </p:cNvSpPr>
+          <p:nvPr>
+            <p:ph type="body"/>
+          </p:nvPr>
+        </p:nvSpPr>
+        <p:spPr>
+          <a:xfrm>
+            <a:off x="4674240" y="1604520"/>
+            <a:ext cx="4015800" cy="1896840"/>
+          </a:xfrm>
+          <a:prstGeom prst="rect">
+            <a:avLst/>
+          </a:prstGeom>
+        </p:spPr>
+        <p:txBody>
+          <a:bodyPr lIns="0" rIns="0" tIns="0" bIns="0"/>
+          <a:p>
+            <a:endParaRPr/>
+          </a:p>
+        </p:txBody>
+      </p:sp>
+      <p:sp>
+        <p:nvSpPr>
+          <p:cNvPr id="19" name="PlaceHolder 4"/>
+          <p:cNvSpPr>
+            <a:spLocks noGrp="1"/>
+          </p:cNvSpPr>
+          <p:nvPr>
+            <p:ph type="body"/>
+          </p:nvPr>
+        </p:nvSpPr>
+        <p:spPr>
+          <a:xfrm>
+            <a:off x="4674240" y="3682080"/>
+            <a:ext cx="4015800" cy="1896840"/>
+          </a:xfrm>
+          <a:prstGeom prst="rect">
+            <a:avLst/>
+          </a:prstGeom>
+        </p:spPr>
+        <p:txBody>
+          <a:bodyPr lIns="0" rIns="0" tIns="0" bIns="0"/>
+          <a:p>
+            <a:endParaRPr/>
+          </a:p>
+        </p:txBody>
+      </p:sp>
+    </p:spTree>
+  </p:cSld>
+</p:sldLayout>
+</file>
+
+<file path=ppt/slideLayouts/slideLayout9.xml><?xml version="1.0" encoding="utf-8"?>
+<p:sldLayout xmlns:a="http://schemas.openxmlformats.org/drawingml/2006/main" xmlns:p="http://schemas.openxmlformats.org/presentationml/2006/main" xmlns:r="http://schemas.openxmlformats.org/officeDocument/2006/relationships" type="twoObjOverTx" preserve="1">
+  <p:cSld name="Title, 2 Content over Content">
+    <p:spTree>
+      <p:nvGrpSpPr>
+        <p:cNvPr id="1" name=""/>
+        <p:cNvGrpSpPr/>
+        <p:nvPr/>
+      </p:nvGrpSpPr>
+      <p:grpSpPr>
+        <a:xfrm>
+          <a:off x="0" y="0"/>
+          <a:ext cx="0" cy="0"/>
+          <a:chOff x="0" y="0"/>
+          <a:chExt cx="0" cy="0"/>
+        </a:xfrm>
+      </p:grpSpPr>
+      <p:sp>
+        <p:nvSpPr>
+          <p:cNvPr id="20" name="PlaceHolder 1"/>
+          <p:cNvSpPr>
+            <a:spLocks noGrp="1"/>
+          </p:cNvSpPr>
+          <p:nvPr>
+            <p:ph type="title"/>
+          </p:nvPr>
+        </p:nvSpPr>
+        <p:spPr>
+          <a:xfrm>
+            <a:off x="457200" y="273600"/>
+            <a:ext cx="8229240" cy="1145160"/>
+          </a:xfrm>
+          <a:prstGeom prst="rect">
+            <a:avLst/>
+          </a:prstGeom>
+        </p:spPr>
+        <p:txBody>
+          <a:bodyPr lIns="0" rIns="0" tIns="0" bIns="0" anchor="ctr"/>
+          <a:p>
+            <a:endParaRPr/>
+          </a:p>
+        </p:txBody>
+      </p:sp>
+      <p:sp>
+        <p:nvSpPr>
+          <p:cNvPr id="21" name="PlaceHolder 2"/>
+          <p:cNvSpPr>
+            <a:spLocks noGrp="1"/>
+          </p:cNvSpPr>
+          <p:nvPr>
+            <p:ph type="body"/>
+          </p:nvPr>
+        </p:nvSpPr>
+        <p:spPr>
+          <a:xfrm>
+            <a:off x="457200" y="1604520"/>
+            <a:ext cx="4015800" cy="1896840"/>
+          </a:xfrm>
+          <a:prstGeom prst="rect">
+            <a:avLst/>
+          </a:prstGeom>
+        </p:spPr>
+        <p:txBody>
+          <a:bodyPr lIns="0" rIns="0" tIns="0" bIns="0"/>
+          <a:p>
+            <a:endParaRPr/>
+          </a:p>
+        </p:txBody>
+      </p:sp>
+      <p:sp>
+        <p:nvSpPr>
+          <p:cNvPr id="22" name="PlaceHolder 3"/>
+          <p:cNvSpPr>
+            <a:spLocks noGrp="1"/>
+          </p:cNvSpPr>
+          <p:nvPr>
+            <p:ph type="body"/>
+          </p:nvPr>
+        </p:nvSpPr>
+        <p:spPr>
+          <a:xfrm>
+            <a:off x="4674240" y="1604520"/>
+            <a:ext cx="4015800" cy="1896840"/>
+          </a:xfrm>
+          <a:prstGeom prst="rect">
+            <a:avLst/>
+          </a:prstGeom>
+        </p:spPr>
+        <p:txBody>
+          <a:bodyPr lIns="0" rIns="0" tIns="0" bIns="0"/>
+          <a:p>
+            <a:endParaRPr/>
+          </a:p>
+        </p:txBody>
+      </p:sp>
+      <p:sp>
+        <p:nvSpPr>
+          <p:cNvPr id="23" name="PlaceHolder 4"/>
+          <p:cNvSpPr>
+            <a:spLocks noGrp="1"/>
+          </p:cNvSpPr>
+          <p:nvPr>
+            <p:ph type="body"/>
+          </p:nvPr>
+        </p:nvSpPr>
+        <p:spPr>
+          <a:xfrm>
+            <a:off x="457200" y="3682080"/>
+            <a:ext cx="8229240" cy="1896840"/>
+          </a:xfrm>
+          <a:prstGeom prst="rect">
+            <a:avLst/>
+          </a:prstGeom>
+        </p:spPr>
+        <p:txBody>
+          <a:bodyPr lIns="0" rIns="0" tIns="0" bIns="0"/>
+          <a:p>
+            <a:endParaRPr/>
+          </a:p>
+        </p:txBody>
+      </p:sp>
+    </p:spTree>
+  </p:cSld>
 </p:sldLayout>
 </file>
 
 <file path=ppt/slideMasters/slideMaster1.xml><?xml version="1.0" encoding="utf-8"?>
-<p:sldMaster xmlns:a="http://schemas.openxmlformats.org/drawingml/2006/main" xmlns:r="http://schemas.openxmlformats.org/officeDocument/2006/relationships" xmlns:p="http://schemas.openxmlformats.org/presentationml/2006/main">
+<p:sldMaster xmlns:a="http://schemas.openxmlformats.org/drawingml/2006/main" xmlns:p="http://schemas.openxmlformats.org/presentationml/2006/main" xmlns:r="http://schemas.openxmlformats.org/officeDocument/2006/relationships">
   <p:cSld>
     <p:bg>
       <p:bgPr>
         <a:solidFill>
-          <a:srgbClr val="FFFFFF"/>
+          <a:srgbClr val="ffffff"/>
         </a:solidFill>
-        <a:effectLst/>
       </p:bgPr>
     </p:bg>
     <p:spTree>
@@ -1362,12 +2336,12 @@
       </p:grpSpPr>
       <p:pic>
         <p:nvPicPr>
-          <p:cNvPr id="3" name="86 Imagen"/>
+          <p:cNvPr id="0" name="86 Imagen" descr=""/>
           <p:cNvPicPr/>
           <p:nvPr/>
         </p:nvPicPr>
         <p:blipFill>
-          <a:blip r:embed="rId14"/>
+          <a:blip r:embed="rId2"/>
           <a:stretch>
             <a:fillRect/>
           </a:stretch>
@@ -1375,7 +2349,7 @@
         <p:spPr>
           <a:xfrm>
             <a:off x="720" y="1080"/>
-            <a:ext cx="9140040" cy="6858360"/>
+            <a:ext cx="9139680" cy="6858000"/>
           </a:xfrm>
           <a:prstGeom prst="rect">
             <a:avLst/>
@@ -1387,7 +2361,7 @@
       </p:pic>
       <p:sp>
         <p:nvSpPr>
-          <p:cNvPr id="4" name="PlaceHolder 1"/>
+          <p:cNvPr id="1" name="PlaceHolder 1"/>
           <p:cNvSpPr>
             <a:spLocks noGrp="1"/>
           </p:cNvSpPr>
@@ -1398,19 +2372,17 @@
         <p:spPr>
           <a:xfrm>
             <a:off x="457200" y="273600"/>
-            <a:ext cx="8229240" cy="1144800"/>
-          </a:xfrm>
-          <a:prstGeom prst="rect">
-            <a:avLst/>
-          </a:prstGeom>
-        </p:spPr>
-        <p:txBody>
-          <a:bodyPr lIns="0" tIns="0" rIns="0" bIns="0" anchor="ctr"/>
-          <a:lstStyle/>
-          <a:p>
-            <a:pPr algn="ctr"/>
+            <a:ext cx="8228880" cy="1144800"/>
+          </a:xfrm>
+          <a:prstGeom prst="rect">
+            <a:avLst/>
+          </a:prstGeom>
+        </p:spPr>
+        <p:txBody>
+          <a:bodyPr lIns="0" rIns="0" tIns="0" bIns="0" anchor="ctr"/>
+          <a:p>
             <a:r>
-              <a:rPr lang="es-EC" sz="4400">
+              <a:rPr lang="es-ES">
                 <a:latin typeface="Arial"/>
               </a:rPr>
               <a:t>Pulse para editar el formato del texto de título</a:t>
@@ -1439,8 +2411,7 @@
           </a:prstGeom>
         </p:spPr>
         <p:txBody>
-          <a:bodyPr lIns="0" tIns="0" rIns="0" bIns="0"/>
-          <a:lstStyle/>
+          <a:bodyPr lIns="0" rIns="0" tIns="0" bIns="0"/>
           <a:p>
             <a:pPr>
               <a:buSzPct val="45000"/>
@@ -1448,7 +2419,7 @@
               <a:buChar char=""/>
             </a:pPr>
             <a:r>
-              <a:rPr lang="es-EC" sz="3200">
+              <a:rPr lang="es-ES">
                 <a:latin typeface="Arial"/>
               </a:rPr>
               <a:t>Pulse para editar el formato de esquema del texto</a:t>
@@ -1462,7 +2433,7 @@
               <a:buChar char=""/>
             </a:pPr>
             <a:r>
-              <a:rPr lang="es-EC" sz="2800">
+              <a:rPr lang="es-ES">
                 <a:latin typeface="Arial"/>
               </a:rPr>
               <a:t>Segundo nivel del esquema</a:t>
@@ -1476,7 +2447,7 @@
               <a:buChar char=""/>
             </a:pPr>
             <a:r>
-              <a:rPr lang="es-EC" sz="2400">
+              <a:rPr lang="es-ES">
                 <a:latin typeface="Arial"/>
               </a:rPr>
               <a:t>Tercer nivel del esquema</a:t>
@@ -1490,7 +2461,7 @@
               <a:buChar char=""/>
             </a:pPr>
             <a:r>
-              <a:rPr lang="es-EC" sz="2000">
+              <a:rPr lang="es-ES">
                 <a:latin typeface="Arial"/>
               </a:rPr>
               <a:t>Cuarto nivel del esquema</a:t>
@@ -1504,7 +2475,7 @@
               <a:buChar char=""/>
             </a:pPr>
             <a:r>
-              <a:rPr lang="es-EC" sz="2000">
+              <a:rPr lang="es-ES" sz="2000">
                 <a:latin typeface="Arial"/>
               </a:rPr>
               <a:t>Quinto nivel del esquema</a:t>
@@ -1518,7 +2489,7 @@
               <a:buChar char=""/>
             </a:pPr>
             <a:r>
-              <a:rPr lang="es-EC" sz="2000">
+              <a:rPr lang="es-ES" sz="2000">
                 <a:latin typeface="Arial"/>
               </a:rPr>
               <a:t>Sexto nivel del esquema</a:t>
@@ -1532,7 +2503,7 @@
               <a:buChar char=""/>
             </a:pPr>
             <a:r>
-              <a:rPr lang="es-EC" sz="2000">
+              <a:rPr lang="es-ES" sz="2000">
                 <a:latin typeface="Arial"/>
               </a:rPr>
               <a:t>Séptimo nivel del esquema</a:t>
@@ -1543,31 +2514,248 @@
       </p:sp>
     </p:spTree>
   </p:cSld>
-  <p:clrMap bg1="lt1" tx1="dk1" bg2="lt2" tx2="dk2" accent1="accent1" accent2="accent2" accent3="accent3" accent4="accent4" accent5="accent5" accent6="accent6" hlink="hlink" folHlink="folHlink"/>
+  <p:clrMap bg1="lt1" bg2="lt2" tx1="dk1" tx2="dk2" accent1="accent1" accent2="accent2" accent3="accent3" accent4="accent4" accent5="accent5" accent6="accent6" hlink="hlink" folHlink="folHlink"/>
   <p:sldLayoutIdLst>
-    <p:sldLayoutId id="2147483649" r:id="rId1"/>
-    <p:sldLayoutId id="2147483650" r:id="rId2"/>
-    <p:sldLayoutId id="2147483651" r:id="rId3"/>
-    <p:sldLayoutId id="2147483652" r:id="rId4"/>
-    <p:sldLayoutId id="2147483653" r:id="rId5"/>
-    <p:sldLayoutId id="2147483654" r:id="rId6"/>
-    <p:sldLayoutId id="2147483655" r:id="rId7"/>
-    <p:sldLayoutId id="2147483656" r:id="rId8"/>
-    <p:sldLayoutId id="2147483657" r:id="rId9"/>
-    <p:sldLayoutId id="2147483658" r:id="rId10"/>
-    <p:sldLayoutId id="2147483659" r:id="rId11"/>
-    <p:sldLayoutId id="2147483660" r:id="rId12"/>
+    <p:sldLayoutId id="2147483649" r:id="rId3"/>
+    <p:sldLayoutId id="2147483650" r:id="rId4"/>
+    <p:sldLayoutId id="2147483651" r:id="rId5"/>
+    <p:sldLayoutId id="2147483652" r:id="rId6"/>
+    <p:sldLayoutId id="2147483653" r:id="rId7"/>
+    <p:sldLayoutId id="2147483654" r:id="rId8"/>
+    <p:sldLayoutId id="2147483655" r:id="rId9"/>
+    <p:sldLayoutId id="2147483656" r:id="rId10"/>
+    <p:sldLayoutId id="2147483657" r:id="rId11"/>
+    <p:sldLayoutId id="2147483658" r:id="rId12"/>
+    <p:sldLayoutId id="2147483659" r:id="rId13"/>
+    <p:sldLayoutId id="2147483660" r:id="rId14"/>
   </p:sldLayoutIdLst>
-  <p:txStyles>
-    <p:titleStyle/>
-    <p:bodyStyle/>
-    <p:otherStyle/>
-  </p:txStyles>
+</p:sldMaster>
+</file>
+
+<file path=ppt/slideMasters/slideMaster2.xml><?xml version="1.0" encoding="utf-8"?>
+<p:sldMaster xmlns:a="http://schemas.openxmlformats.org/drawingml/2006/main" xmlns:p="http://schemas.openxmlformats.org/presentationml/2006/main" xmlns:r="http://schemas.openxmlformats.org/officeDocument/2006/relationships">
+  <p:cSld>
+    <p:bg>
+      <p:bgPr>
+        <a:solidFill>
+          <a:srgbClr val="ffffff"/>
+        </a:solidFill>
+      </p:bgPr>
+    </p:bg>
+    <p:spTree>
+      <p:nvGrpSpPr>
+        <p:cNvPr id="1" name=""/>
+        <p:cNvGrpSpPr/>
+        <p:nvPr/>
+      </p:nvGrpSpPr>
+      <p:grpSpPr>
+        <a:xfrm>
+          <a:off x="0" y="0"/>
+          <a:ext cx="0" cy="0"/>
+          <a:chOff x="0" y="0"/>
+          <a:chExt cx="0" cy="0"/>
+        </a:xfrm>
+      </p:grpSpPr>
+      <p:pic>
+        <p:nvPicPr>
+          <p:cNvPr id="37" name="86 Imagen" descr=""/>
+          <p:cNvPicPr/>
+          <p:nvPr/>
+        </p:nvPicPr>
+        <p:blipFill>
+          <a:blip r:embed="rId2"/>
+          <a:stretch>
+            <a:fillRect/>
+          </a:stretch>
+        </p:blipFill>
+        <p:spPr>
+          <a:xfrm>
+            <a:off x="720" y="1080"/>
+            <a:ext cx="9139680" cy="6858000"/>
+          </a:xfrm>
+          <a:prstGeom prst="rect">
+            <a:avLst/>
+          </a:prstGeom>
+          <a:ln>
+            <a:noFill/>
+          </a:ln>
+        </p:spPr>
+      </p:pic>
+      <p:sp>
+        <p:nvSpPr>
+          <p:cNvPr id="38" name="PlaceHolder 1"/>
+          <p:cNvSpPr>
+            <a:spLocks noGrp="1"/>
+          </p:cNvSpPr>
+          <p:nvPr>
+            <p:ph type="title"/>
+          </p:nvPr>
+        </p:nvSpPr>
+        <p:spPr>
+          <a:xfrm>
+            <a:off x="457200" y="273600"/>
+            <a:ext cx="8229240" cy="1144800"/>
+          </a:xfrm>
+          <a:prstGeom prst="rect">
+            <a:avLst/>
+          </a:prstGeom>
+        </p:spPr>
+        <p:txBody>
+          <a:bodyPr lIns="0" rIns="0" tIns="0" bIns="0" anchor="ctr"/>
+          <a:p>
+            <a:r>
+              <a:rPr lang="es-ES">
+                <a:latin typeface="Arial"/>
+              </a:rPr>
+              <a:t>Pulse para editar el formato del texto de título</a:t>
+            </a:r>
+            <a:endParaRPr/>
+          </a:p>
+        </p:txBody>
+      </p:sp>
+      <p:sp>
+        <p:nvSpPr>
+          <p:cNvPr id="39" name="PlaceHolder 2"/>
+          <p:cNvSpPr>
+            <a:spLocks noGrp="1"/>
+          </p:cNvSpPr>
+          <p:nvPr>
+            <p:ph type="body"/>
+          </p:nvPr>
+        </p:nvSpPr>
+        <p:spPr>
+          <a:xfrm>
+            <a:off x="457200" y="1604520"/>
+            <a:ext cx="8229240" cy="3977280"/>
+          </a:xfrm>
+          <a:prstGeom prst="rect">
+            <a:avLst/>
+          </a:prstGeom>
+        </p:spPr>
+        <p:txBody>
+          <a:bodyPr lIns="0" rIns="0" tIns="0" bIns="0"/>
+          <a:p>
+            <a:pPr>
+              <a:buSzPct val="45000"/>
+              <a:buFont typeface="StarSymbol"/>
+              <a:buChar char=""/>
+            </a:pPr>
+            <a:r>
+              <a:rPr lang="es-ES">
+                <a:latin typeface="Arial"/>
+              </a:rPr>
+              <a:t>Pulse para editar el formato de esquema del texto</a:t>
+            </a:r>
+            <a:endParaRPr/>
+          </a:p>
+          <a:p>
+            <a:pPr lvl="1">
+              <a:buSzPct val="75000"/>
+              <a:buFont typeface="StarSymbol"/>
+              <a:buChar char=""/>
+            </a:pPr>
+            <a:r>
+              <a:rPr lang="es-ES">
+                <a:latin typeface="Arial"/>
+              </a:rPr>
+              <a:t>Segundo nivel del esquema</a:t>
+            </a:r>
+            <a:endParaRPr/>
+          </a:p>
+          <a:p>
+            <a:pPr lvl="2">
+              <a:buSzPct val="45000"/>
+              <a:buFont typeface="StarSymbol"/>
+              <a:buChar char=""/>
+            </a:pPr>
+            <a:r>
+              <a:rPr lang="es-ES">
+                <a:latin typeface="Arial"/>
+              </a:rPr>
+              <a:t>Tercer nivel del esquema</a:t>
+            </a:r>
+            <a:endParaRPr/>
+          </a:p>
+          <a:p>
+            <a:pPr lvl="3">
+              <a:buSzPct val="75000"/>
+              <a:buFont typeface="StarSymbol"/>
+              <a:buChar char=""/>
+            </a:pPr>
+            <a:r>
+              <a:rPr lang="es-ES">
+                <a:latin typeface="Arial"/>
+              </a:rPr>
+              <a:t>Cuarto nivel del esquema</a:t>
+            </a:r>
+            <a:endParaRPr/>
+          </a:p>
+          <a:p>
+            <a:pPr lvl="4">
+              <a:buSzPct val="45000"/>
+              <a:buFont typeface="StarSymbol"/>
+              <a:buChar char=""/>
+            </a:pPr>
+            <a:r>
+              <a:rPr lang="es-ES" sz="2000">
+                <a:latin typeface="Arial"/>
+              </a:rPr>
+              <a:t>Quinto nivel del esquema</a:t>
+            </a:r>
+            <a:endParaRPr/>
+          </a:p>
+          <a:p>
+            <a:pPr lvl="5">
+              <a:buSzPct val="45000"/>
+              <a:buFont typeface="StarSymbol"/>
+              <a:buChar char=""/>
+            </a:pPr>
+            <a:r>
+              <a:rPr lang="es-ES" sz="2000">
+                <a:latin typeface="Arial"/>
+              </a:rPr>
+              <a:t>Sexto nivel del esquema</a:t>
+            </a:r>
+            <a:endParaRPr/>
+          </a:p>
+          <a:p>
+            <a:pPr lvl="6">
+              <a:buSzPct val="45000"/>
+              <a:buFont typeface="StarSymbol"/>
+              <a:buChar char=""/>
+            </a:pPr>
+            <a:r>
+              <a:rPr lang="es-ES" sz="2000">
+                <a:latin typeface="Arial"/>
+              </a:rPr>
+              <a:t>Séptimo nivel del esquema</a:t>
+            </a:r>
+            <a:endParaRPr/>
+          </a:p>
+        </p:txBody>
+      </p:sp>
+    </p:spTree>
+  </p:cSld>
+  <p:clrMap bg1="lt1" bg2="lt2" tx1="dk1" tx2="dk2" accent1="accent1" accent2="accent2" accent3="accent3" accent4="accent4" accent5="accent5" accent6="accent6" hlink="hlink" folHlink="folHlink"/>
+  <p:sldLayoutIdLst>
+    <p:sldLayoutId id="2147483662" r:id="rId3"/>
+    <p:sldLayoutId id="2147483663" r:id="rId4"/>
+    <p:sldLayoutId id="2147483664" r:id="rId5"/>
+    <p:sldLayoutId id="2147483665" r:id="rId6"/>
+    <p:sldLayoutId id="2147483666" r:id="rId7"/>
+    <p:sldLayoutId id="2147483667" r:id="rId8"/>
+    <p:sldLayoutId id="2147483668" r:id="rId9"/>
+    <p:sldLayoutId id="2147483669" r:id="rId10"/>
+    <p:sldLayoutId id="2147483670" r:id="rId11"/>
+    <p:sldLayoutId id="2147483671" r:id="rId12"/>
+    <p:sldLayoutId id="2147483672" r:id="rId13"/>
+    <p:sldLayoutId id="2147483673" r:id="rId14"/>
+  </p:sldLayoutIdLst>
 </p:sldMaster>
 </file>
 
 <file path=ppt/slides/slide1.xml><?xml version="1.0" encoding="utf-8"?>
-<p:sld xmlns:a="http://schemas.openxmlformats.org/drawingml/2006/main" xmlns:r="http://schemas.openxmlformats.org/officeDocument/2006/relationships" xmlns:p="http://schemas.openxmlformats.org/presentationml/2006/main">
+<p:sld xmlns:a="http://schemas.openxmlformats.org/drawingml/2006/main" xmlns:p="http://schemas.openxmlformats.org/presentationml/2006/main" xmlns:r="http://schemas.openxmlformats.org/officeDocument/2006/relationships">
   <p:cSld>
     <p:spTree>
       <p:nvGrpSpPr>
@@ -1585,48 +2773,71 @@
       </p:grpSpPr>
       <p:sp>
         <p:nvSpPr>
-          <p:cNvPr id="2" name="1 Título"/>
-          <p:cNvSpPr>
-            <a:spLocks noGrp="1"/>
-          </p:cNvSpPr>
-          <p:nvPr>
-            <p:ph type="title"/>
-          </p:nvPr>
-        </p:nvSpPr>
-        <p:spPr>
-          <a:xfrm>
-            <a:off x="533400" y="2514600"/>
-            <a:ext cx="8229600" cy="1145160"/>
-          </a:xfrm>
-        </p:spPr>
-        <p:txBody>
-          <a:bodyPr/>
-          <a:lstStyle/>
-          <a:p>
-            <a:pPr algn="ctr"/>
+          <p:cNvPr id="74" name="TextShape 1"/>
+          <p:cNvSpPr txBox="1"/>
+          <p:nvPr/>
+        </p:nvSpPr>
+        <p:spPr>
+          <a:xfrm>
+            <a:off x="533520" y="2514600"/>
+            <a:ext cx="8229240" cy="1144800"/>
+          </a:xfrm>
+          <a:prstGeom prst="rect">
+            <a:avLst/>
+          </a:prstGeom>
+        </p:spPr>
+        <p:txBody>
+          <a:bodyPr lIns="0" rIns="0" tIns="0" bIns="0" anchor="ctr"/>
+          <a:p>
+            <a:pPr algn="ctr">
+              <a:lnSpc>
+                <a:spcPct val="100000"/>
+              </a:lnSpc>
+            </a:pPr>
             <a:r>
-              <a:rPr lang="en-US" sz="5400" dirty="0" err="1" smtClean="0"/>
+              <a:rPr lang="es-ES" sz="5400">
+                <a:latin typeface="Arial"/>
+              </a:rPr>
               <a:t>PicPick</a:t>
             </a:r>
-            <a:endParaRPr lang="es-ES" sz="5400" dirty="0"/>
+            <a:endParaRPr/>
           </a:p>
         </p:txBody>
       </p:sp>
     </p:spTree>
-    <p:extLst>
-      <p:ext uri="{BB962C8B-B14F-4D97-AF65-F5344CB8AC3E}">
-        <p14:creationId xmlns:p14="http://schemas.microsoft.com/office/powerpoint/2010/main" val="3628604417"/>
-      </p:ext>
-    </p:extLst>
   </p:cSld>
-  <p:clrMapOvr>
-    <a:masterClrMapping/>
-  </p:clrMapOvr>
+  <p:timing>
+    <p:tnLst>
+      <p:par>
+        <p:cTn id="1" dur="indefinite" restart="never" nodeType="tmRoot">
+          <p:childTnLst>
+            <p:seq>
+              <p:cTn id="2" nodeType="mainSeq"/>
+              <p:prevCondLst>
+                <p:cond delay="0" evt="onPrev">
+                  <p:tgtEl>
+                    <p:sldTgt/>
+                  </p:tgtEl>
+                </p:cond>
+              </p:prevCondLst>
+              <p:nextCondLst>
+                <p:cond delay="0" evt="onNext">
+                  <p:tgtEl>
+                    <p:sldTgt/>
+                  </p:tgtEl>
+                </p:cond>
+              </p:nextCondLst>
+            </p:seq>
+          </p:childTnLst>
+        </p:cTn>
+      </p:par>
+    </p:tnLst>
+  </p:timing>
 </p:sld>
 </file>
 
 <file path=ppt/slides/slide2.xml><?xml version="1.0" encoding="utf-8"?>
-<p:sld xmlns:a="http://schemas.openxmlformats.org/drawingml/2006/main" xmlns:r="http://schemas.openxmlformats.org/officeDocument/2006/relationships" xmlns:p="http://schemas.openxmlformats.org/presentationml/2006/main">
+<p:sld xmlns:a="http://schemas.openxmlformats.org/drawingml/2006/main" xmlns:p="http://schemas.openxmlformats.org/presentationml/2006/main" xmlns:r="http://schemas.openxmlformats.org/officeDocument/2006/relationships">
   <p:cSld>
     <p:spTree>
       <p:nvGrpSpPr>
@@ -1644,216 +2855,143 @@
       </p:grpSpPr>
       <p:sp>
         <p:nvSpPr>
-          <p:cNvPr id="2" name="1 CuadroTexto"/>
-          <p:cNvSpPr txBox="1"/>
+          <p:cNvPr id="75" name="CustomShape 1"/>
+          <p:cNvSpPr/>
           <p:nvPr/>
         </p:nvSpPr>
         <p:spPr>
           <a:xfrm>
-            <a:off x="381000" y="304800"/>
-            <a:ext cx="5334000" cy="584775"/>
+            <a:off x="380880" y="304920"/>
+            <a:ext cx="5333760" cy="577800"/>
           </a:xfrm>
           <a:prstGeom prst="rect">
             <a:avLst/>
           </a:prstGeom>
           <a:noFill/>
-        </p:spPr>
-        <p:txBody>
-          <a:bodyPr wrap="square" rtlCol="0">
-            <a:spAutoFit/>
-          </a:bodyPr>
-          <a:lstStyle/>
-          <a:p>
+          <a:ln>
+            <a:noFill/>
+          </a:ln>
+        </p:spPr>
+        <p:txBody>
+          <a:bodyPr lIns="90000" rIns="90000" tIns="45000" bIns="45000"/>
+          <a:p>
+            <a:pPr>
+              <a:lnSpc>
+                <a:spcPct val="100000"/>
+              </a:lnSpc>
+            </a:pPr>
             <a:r>
-              <a:rPr lang="en-US" sz="3200" b="1" dirty="0" err="1" smtClean="0">
+              <a:rPr b="1" lang="es-EC" sz="3200">
                 <a:solidFill>
-                  <a:schemeClr val="bg1"/>
+                  <a:srgbClr val="ffffff"/>
                 </a:solidFill>
+                <a:latin typeface="Arial"/>
+                <a:ea typeface="DejaVu Sans"/>
               </a:rPr>
               <a:t>Concepto</a:t>
             </a:r>
-            <a:endParaRPr lang="es-ES" sz="3200" b="1" dirty="0">
-              <a:solidFill>
-                <a:schemeClr val="bg1"/>
-              </a:solidFill>
-            </a:endParaRPr>
-          </a:p>
-        </p:txBody>
-      </p:sp>
-      <p:sp>
-        <p:nvSpPr>
-          <p:cNvPr id="3" name="2 CuadroTexto"/>
-          <p:cNvSpPr txBox="1"/>
+            <a:endParaRPr/>
+          </a:p>
+        </p:txBody>
+      </p:sp>
+      <p:sp>
+        <p:nvSpPr>
+          <p:cNvPr id="76" name="CustomShape 2"/>
+          <p:cNvSpPr/>
           <p:nvPr/>
         </p:nvSpPr>
         <p:spPr>
           <a:xfrm>
-            <a:off x="381000" y="1371600"/>
-            <a:ext cx="8305800" cy="2677656"/>
+            <a:off x="380880" y="1371600"/>
+            <a:ext cx="8305560" cy="2649960"/>
           </a:xfrm>
           <a:prstGeom prst="rect">
             <a:avLst/>
           </a:prstGeom>
           <a:noFill/>
-        </p:spPr>
-        <p:txBody>
-          <a:bodyPr wrap="square" rtlCol="0">
-            <a:spAutoFit/>
-          </a:bodyPr>
-          <a:lstStyle/>
-          <a:p>
+          <a:ln>
+            <a:noFill/>
+          </a:ln>
+        </p:spPr>
+        <p:txBody>
+          <a:bodyPr lIns="90000" rIns="90000" tIns="45000" bIns="45000"/>
+          <a:p>
+            <a:pPr>
+              <a:lnSpc>
+                <a:spcPct val="100000"/>
+              </a:lnSpc>
+            </a:pPr>
             <a:r>
-              <a:rPr lang="es-ES" sz="2800" dirty="0" smtClean="0"/>
-              <a:t>Es </a:t>
+              <a:rPr lang="es-EC" sz="2800">
+                <a:solidFill>
+                  <a:srgbClr val="000000"/>
+                </a:solidFill>
+                <a:latin typeface="Arial"/>
+                <a:ea typeface="DejaVu Sans"/>
+              </a:rPr>
+              <a:t>Es una herramienta de captura de pantalla o </a:t>
             </a:r>
             <a:r>
-              <a:rPr lang="es-ES" sz="2800" dirty="0"/>
-              <a:t>una herramienta de captura de pantalla o </a:t>
+              <a:rPr i="1" lang="es-EC" sz="2800">
+                <a:solidFill>
+                  <a:srgbClr val="000000"/>
+                </a:solidFill>
+                <a:latin typeface="Arial"/>
+                <a:ea typeface="DejaVu Sans"/>
+              </a:rPr>
+              <a:t>snipping tool </a:t>
             </a:r>
             <a:r>
-              <a:rPr lang="es-ES" sz="2800" i="1" dirty="0" err="1"/>
-              <a:t>snipping</a:t>
+              <a:rPr lang="es-EC" sz="2800">
+                <a:solidFill>
+                  <a:srgbClr val="000000"/>
+                </a:solidFill>
+                <a:latin typeface="Arial"/>
+                <a:ea typeface="DejaVu Sans"/>
+              </a:rPr>
+              <a:t>que permite seleccionar toda la pantalla, o una parte de la misma y automáticamente abre un editor para retocar la imagen, mejorarla, crear efectos, añadir texto, etc.</a:t>
             </a:r>
-            <a:r>
-              <a:rPr lang="es-ES" sz="2800" i="1" dirty="0"/>
-              <a:t> </a:t>
-            </a:r>
-            <a:r>
-              <a:rPr lang="es-ES" sz="2800" i="1" dirty="0" err="1"/>
-              <a:t>tool</a:t>
-            </a:r>
-            <a:r>
-              <a:rPr lang="es-ES" sz="2800" i="1" dirty="0"/>
-              <a:t> </a:t>
-            </a:r>
-            <a:r>
-              <a:rPr lang="es-ES" sz="2800" dirty="0" smtClean="0"/>
-              <a:t>que permite </a:t>
-            </a:r>
-            <a:r>
-              <a:rPr lang="es-ES" sz="2800" dirty="0"/>
-              <a:t>seleccionar toda la pantalla, o una parte </a:t>
-            </a:r>
-            <a:r>
-              <a:rPr lang="es-ES" sz="2800" dirty="0" smtClean="0"/>
-              <a:t>de la </a:t>
-            </a:r>
-            <a:r>
-              <a:rPr lang="es-ES" sz="2800" dirty="0"/>
-              <a:t>misma </a:t>
-            </a:r>
-            <a:r>
-              <a:rPr lang="es-ES" sz="2800" dirty="0" smtClean="0"/>
-              <a:t>y automáticamente </a:t>
-            </a:r>
-            <a:r>
-              <a:rPr lang="es-ES" sz="2800" dirty="0"/>
-              <a:t>abre un editor para </a:t>
-            </a:r>
-            <a:r>
-              <a:rPr lang="es-ES" sz="2800" dirty="0" smtClean="0"/>
-              <a:t>retocar la </a:t>
-            </a:r>
-            <a:r>
-              <a:rPr lang="es-ES" sz="2800" dirty="0"/>
-              <a:t>imagen, mejorarla, crear efectos, </a:t>
-            </a:r>
-            <a:r>
-              <a:rPr lang="es-ES" sz="2800" dirty="0" smtClean="0"/>
-              <a:t>añadir texto</a:t>
-            </a:r>
-            <a:r>
-              <a:rPr lang="es-ES" sz="2800" dirty="0"/>
-              <a:t>, etc</a:t>
-            </a:r>
-            <a:r>
-              <a:rPr lang="es-ES" sz="2800" dirty="0" smtClean="0"/>
-              <a:t>.</a:t>
-            </a:r>
-          </a:p>
-          <a:p>
-            <a:endParaRPr lang="es-ES" sz="2800" dirty="0"/>
+            <a:endParaRPr/>
+          </a:p>
+          <a:p>
+            <a:pPr>
+              <a:lnSpc>
+                <a:spcPct val="100000"/>
+              </a:lnSpc>
+            </a:pPr>
+            <a:endParaRPr/>
           </a:p>
         </p:txBody>
       </p:sp>
     </p:spTree>
-    <p:extLst>
-      <p:ext uri="{BB962C8B-B14F-4D97-AF65-F5344CB8AC3E}">
-        <p14:creationId xmlns:p14="http://schemas.microsoft.com/office/powerpoint/2010/main" val="3172612679"/>
-      </p:ext>
-    </p:extLst>
   </p:cSld>
-  <p:clrMapOvr>
-    <a:masterClrMapping/>
-  </p:clrMapOvr>
-</p:sld>
-</file>
-
-<file path=ppt/slides/slide3.xml><?xml version="1.0" encoding="utf-8"?>
-<p:sld xmlns:a="http://schemas.openxmlformats.org/drawingml/2006/main" xmlns:r="http://schemas.openxmlformats.org/officeDocument/2006/relationships" xmlns:p="http://schemas.openxmlformats.org/presentationml/2006/main">
-  <p:cSld>
-    <p:spTree>
-      <p:nvGrpSpPr>
-        <p:cNvPr id="1" name=""/>
-        <p:cNvGrpSpPr/>
-        <p:nvPr/>
-      </p:nvGrpSpPr>
-      <p:grpSpPr>
-        <a:xfrm>
-          <a:off x="0" y="0"/>
-          <a:ext cx="0" cy="0"/>
-          <a:chOff x="0" y="0"/>
-          <a:chExt cx="0" cy="0"/>
-        </a:xfrm>
-      </p:grpSpPr>
-      <p:sp>
-        <p:nvSpPr>
-          <p:cNvPr id="2" name="1 CuadroTexto"/>
-          <p:cNvSpPr txBox="1"/>
-          <p:nvPr/>
-        </p:nvSpPr>
-        <p:spPr>
-          <a:xfrm>
-            <a:off x="381000" y="304800"/>
-            <a:ext cx="5334000" cy="584775"/>
-          </a:xfrm>
-          <a:prstGeom prst="rect">
-            <a:avLst/>
-          </a:prstGeom>
-          <a:noFill/>
-        </p:spPr>
-        <p:txBody>
-          <a:bodyPr wrap="square" rtlCol="0">
-            <a:spAutoFit/>
-          </a:bodyPr>
-          <a:lstStyle/>
-          <a:p>
-            <a:r>
-              <a:rPr lang="en-US" sz="3200" b="1" dirty="0" err="1" smtClean="0">
-                <a:solidFill>
-                  <a:schemeClr val="bg1"/>
-                </a:solidFill>
-              </a:rPr>
-              <a:t>Herramientas</a:t>
-            </a:r>
-            <a:endParaRPr lang="es-ES" sz="3200" b="1" dirty="0">
-              <a:solidFill>
-                <a:schemeClr val="bg1"/>
-              </a:solidFill>
-            </a:endParaRPr>
-          </a:p>
-        </p:txBody>
-      </p:sp>
-    </p:spTree>
-    <p:extLst>
-      <p:ext uri="{BB962C8B-B14F-4D97-AF65-F5344CB8AC3E}">
-        <p14:creationId xmlns:p14="http://schemas.microsoft.com/office/powerpoint/2010/main" val="3446273230"/>
-      </p:ext>
-    </p:extLst>
-  </p:cSld>
-  <p:clrMapOvr>
-    <a:masterClrMapping/>
-  </p:clrMapOvr>
+  <p:timing>
+    <p:tnLst>
+      <p:par>
+        <p:cTn id="3" dur="indefinite" restart="never" nodeType="tmRoot">
+          <p:childTnLst>
+            <p:seq>
+              <p:cTn id="4" nodeType="mainSeq"/>
+              <p:prevCondLst>
+                <p:cond delay="0" evt="onPrev">
+                  <p:tgtEl>
+                    <p:sldTgt/>
+                  </p:tgtEl>
+                </p:cond>
+              </p:prevCondLst>
+              <p:nextCondLst>
+                <p:cond delay="0" evt="onNext">
+                  <p:tgtEl>
+                    <p:sldTgt/>
+                  </p:tgtEl>
+                </p:cond>
+              </p:nextCondLst>
+            </p:seq>
+          </p:childTnLst>
+        </p:cTn>
+      </p:par>
+    </p:tnLst>
+  </p:timing>
 </p:sld>
 </file>
 
@@ -2077,7 +3215,228 @@
       </a:bgFillStyleLst>
     </a:fmtScheme>
   </a:themeElements>
-  <a:objectDefaults/>
-  <a:extraClrSchemeLst/>
+</a:theme>
+</file>
+
+<file path=ppt/theme/theme2.xml><?xml version="1.0" encoding="utf-8"?>
+<a:theme xmlns:a="http://schemas.openxmlformats.org/drawingml/2006/main" name="Office Theme">
+  <a:themeElements>
+    <a:clrScheme name="Office">
+      <a:dk1>
+        <a:sysClr val="windowText" lastClr="000000"/>
+      </a:dk1>
+      <a:lt1>
+        <a:sysClr val="window" lastClr="FFFFFF"/>
+      </a:lt1>
+      <a:dk2>
+        <a:srgbClr val="1F497D"/>
+      </a:dk2>
+      <a:lt2>
+        <a:srgbClr val="EEECE1"/>
+      </a:lt2>
+      <a:accent1>
+        <a:srgbClr val="4F81BD"/>
+      </a:accent1>
+      <a:accent2>
+        <a:srgbClr val="C0504D"/>
+      </a:accent2>
+      <a:accent3>
+        <a:srgbClr val="9BBB59"/>
+      </a:accent3>
+      <a:accent4>
+        <a:srgbClr val="8064A2"/>
+      </a:accent4>
+      <a:accent5>
+        <a:srgbClr val="4BACC6"/>
+      </a:accent5>
+      <a:accent6>
+        <a:srgbClr val="F79646"/>
+      </a:accent6>
+      <a:hlink>
+        <a:srgbClr val="0000FF"/>
+      </a:hlink>
+      <a:folHlink>
+        <a:srgbClr val="800080"/>
+      </a:folHlink>
+    </a:clrScheme>
+    <a:fontScheme name="Office">
+      <a:majorFont>
+        <a:latin typeface="Arial"/>
+        <a:ea typeface="DejaVu Sans"/>
+        <a:cs typeface="DejaVu Sans"/>
+      </a:majorFont>
+      <a:minorFont>
+        <a:latin typeface="Arial"/>
+        <a:ea typeface="DejaVu Sans"/>
+        <a:cs typeface="DejaVu Sans"/>
+      </a:minorFont>
+    </a:fontScheme>
+    <a:fmtScheme name="Office">
+      <a:fillStyleLst>
+        <a:solidFill>
+          <a:schemeClr val="phClr"/>
+        </a:solidFill>
+        <a:gradFill rotWithShape="1">
+          <a:gsLst>
+            <a:gs pos="0">
+              <a:schemeClr val="phClr">
+                <a:tint val="50000"/>
+                <a:satMod val="300000"/>
+              </a:schemeClr>
+            </a:gs>
+            <a:gs pos="35000">
+              <a:schemeClr val="phClr">
+                <a:tint val="37000"/>
+                <a:satMod val="300000"/>
+              </a:schemeClr>
+            </a:gs>
+            <a:gs pos="100000">
+              <a:schemeClr val="phClr">
+                <a:tint val="15000"/>
+                <a:satMod val="350000"/>
+              </a:schemeClr>
+            </a:gs>
+          </a:gsLst>
+          <a:lin ang="16200000" scaled="1"/>
+        </a:gradFill>
+        <a:gradFill rotWithShape="1">
+          <a:gsLst>
+            <a:gs pos="0">
+              <a:schemeClr val="phClr">
+                <a:shade val="51000"/>
+                <a:satMod val="130000"/>
+              </a:schemeClr>
+            </a:gs>
+            <a:gs pos="80000">
+              <a:schemeClr val="phClr">
+                <a:shade val="93000"/>
+                <a:satMod val="130000"/>
+              </a:schemeClr>
+            </a:gs>
+            <a:gs pos="100000">
+              <a:schemeClr val="phClr">
+                <a:shade val="94000"/>
+                <a:satMod val="135000"/>
+              </a:schemeClr>
+            </a:gs>
+          </a:gsLst>
+          <a:lin ang="16200000" scaled="0"/>
+        </a:gradFill>
+      </a:fillStyleLst>
+      <a:lnStyleLst>
+        <a:ln w="9525" cap="flat" cmpd="sng" algn="ctr">
+          <a:solidFill>
+            <a:schemeClr val="phClr">
+              <a:shade val="95000"/>
+              <a:satMod val="105000"/>
+            </a:schemeClr>
+          </a:solidFill>
+          <a:prstDash val="solid"/>
+        </a:ln>
+        <a:ln w="25400" cap="flat" cmpd="sng" algn="ctr">
+          <a:solidFill>
+            <a:schemeClr val="phClr"/>
+          </a:solidFill>
+          <a:prstDash val="solid"/>
+        </a:ln>
+        <a:ln w="38100" cap="flat" cmpd="sng" algn="ctr">
+          <a:solidFill>
+            <a:schemeClr val="phClr"/>
+          </a:solidFill>
+          <a:prstDash val="solid"/>
+        </a:ln>
+      </a:lnStyleLst>
+      <a:effectStyleLst>
+        <a:effectStyle>
+          <a:effectLst>
+            <a:outerShdw blurRad="40000" dist="20000" dir="5400000" rotWithShape="0">
+              <a:srgbClr val="000000">
+                <a:alpha val="38000"/>
+              </a:srgbClr>
+            </a:outerShdw>
+          </a:effectLst>
+        </a:effectStyle>
+        <a:effectStyle>
+          <a:effectLst>
+            <a:outerShdw blurRad="40000" dist="23000" dir="5400000" rotWithShape="0">
+              <a:srgbClr val="000000">
+                <a:alpha val="35000"/>
+              </a:srgbClr>
+            </a:outerShdw>
+          </a:effectLst>
+        </a:effectStyle>
+        <a:effectStyle>
+          <a:effectLst>
+            <a:outerShdw blurRad="40000" dist="23000" dir="5400000" rotWithShape="0">
+              <a:srgbClr val="000000">
+                <a:alpha val="35000"/>
+              </a:srgbClr>
+            </a:outerShdw>
+          </a:effectLst>
+          <a:scene3d>
+            <a:camera prst="orthographicFront">
+              <a:rot lat="0" lon="0" rev="0"/>
+            </a:camera>
+            <a:lightRig rig="threePt" dir="t">
+              <a:rot lat="0" lon="0" rev="1200000"/>
+            </a:lightRig>
+          </a:scene3d>
+          <a:sp3d>
+            <a:bevelT w="63500" h="25400"/>
+          </a:sp3d>
+        </a:effectStyle>
+      </a:effectStyleLst>
+      <a:bgFillStyleLst>
+        <a:solidFill>
+          <a:schemeClr val="phClr"/>
+        </a:solidFill>
+        <a:gradFill rotWithShape="1">
+          <a:gsLst>
+            <a:gs pos="0">
+              <a:schemeClr val="phClr">
+                <a:tint val="40000"/>
+                <a:satMod val="350000"/>
+              </a:schemeClr>
+            </a:gs>
+            <a:gs pos="40000">
+              <a:schemeClr val="phClr">
+                <a:tint val="45000"/>
+                <a:shade val="99000"/>
+                <a:satMod val="350000"/>
+              </a:schemeClr>
+            </a:gs>
+            <a:gs pos="100000">
+              <a:schemeClr val="phClr">
+                <a:shade val="20000"/>
+                <a:satMod val="255000"/>
+              </a:schemeClr>
+            </a:gs>
+          </a:gsLst>
+          <a:path path="circle">
+            <a:fillToRect l="50000" t="-80000" r="50000" b="180000"/>
+          </a:path>
+        </a:gradFill>
+        <a:gradFill rotWithShape="1">
+          <a:gsLst>
+            <a:gs pos="0">
+              <a:schemeClr val="phClr">
+                <a:tint val="80000"/>
+                <a:satMod val="300000"/>
+              </a:schemeClr>
+            </a:gs>
+            <a:gs pos="100000">
+              <a:schemeClr val="phClr">
+                <a:shade val="30000"/>
+                <a:satMod val="200000"/>
+              </a:schemeClr>
+            </a:gs>
+          </a:gsLst>
+          <a:path path="circle">
+            <a:fillToRect l="50000" t="50000" r="50000" b="50000"/>
+          </a:path>
+        </a:gradFill>
+      </a:bgFillStyleLst>
+    </a:fmtScheme>
+  </a:themeElements>
 </a:theme>
 </file>
</xml_diff>